<commit_message>
finished presentation, finally got a name for the group, and finished tests on the frontend
</commit_message>
<xml_diff>
--- a/Documentation/REPONT PRESENTÁCIÓ 2035. 03. 28..pptx
+++ b/Documentation/REPONT PRESENTÁCIÓ 2035. 03. 28..pptx
@@ -5,18 +5,20 @@
     <p:sldMasterId id="2147483822" r:id="rId4"/>
   </p:sldMasterIdLst>
   <p:notesMasterIdLst>
-    <p:notesMasterId r:id="rId11"/>
+    <p:notesMasterId r:id="rId13"/>
   </p:notesMasterIdLst>
   <p:handoutMasterIdLst>
-    <p:handoutMasterId r:id="rId12"/>
+    <p:handoutMasterId r:id="rId14"/>
   </p:handoutMasterIdLst>
   <p:sldIdLst>
     <p:sldId id="256" r:id="rId5"/>
     <p:sldId id="265" r:id="rId6"/>
     <p:sldId id="258" r:id="rId7"/>
     <p:sldId id="259" r:id="rId8"/>
-    <p:sldId id="266" r:id="rId9"/>
-    <p:sldId id="263" r:id="rId10"/>
+    <p:sldId id="267" r:id="rId9"/>
+    <p:sldId id="268" r:id="rId10"/>
+    <p:sldId id="266" r:id="rId11"/>
+    <p:sldId id="263" r:id="rId12"/>
   </p:sldIdLst>
   <p:sldSz cx="12192000" cy="6858000"/>
   <p:notesSz cx="6858000" cy="9144000"/>
@@ -126,824 +128,6 @@
 </p:presentation>
 </file>
 
-<file path=ppt/charts/chart1.xml><?xml version="1.0" encoding="utf-8"?>
-<c:chartSpace xmlns:c="http://schemas.openxmlformats.org/drawingml/2006/chart" xmlns:a="http://schemas.openxmlformats.org/drawingml/2006/main" xmlns:r="http://schemas.openxmlformats.org/officeDocument/2006/relationships" xmlns:c16r2="http://schemas.microsoft.com/office/drawing/2015/06/chart">
-  <c:date1904 val="0"/>
-  <c:lang val="hu-HU"/>
-  <c:roundedCorners val="0"/>
-  <mc:AlternateContent xmlns:mc="http://schemas.openxmlformats.org/markup-compatibility/2006">
-    <mc:Choice xmlns:c14="http://schemas.microsoft.com/office/drawing/2007/8/2/chart" Requires="c14">
-      <c14:style val="101"/>
-    </mc:Choice>
-    <mc:Fallback>
-      <c:style val="1"/>
-    </mc:Fallback>
-  </mc:AlternateContent>
-  <c:chart>
-    <c:autoTitleDeleted val="1"/>
-    <c:plotArea>
-      <c:layout/>
-      <c:doughnutChart>
-        <c:varyColors val="1"/>
-        <c:ser>
-          <c:idx val="0"/>
-          <c:order val="0"/>
-          <c:spPr>
-            <a:ln>
-              <a:noFill/>
-            </a:ln>
-          </c:spPr>
-          <c:dPt>
-            <c:idx val="0"/>
-            <c:bubble3D val="0"/>
-            <c:spPr>
-              <a:gradFill>
-                <a:gsLst>
-                  <a:gs pos="0">
-                    <a:schemeClr val="accent5"/>
-                  </a:gs>
-                  <a:gs pos="12000">
-                    <a:schemeClr val="accent1">
-                      <a:lumMod val="89000"/>
-                    </a:schemeClr>
-                  </a:gs>
-                  <a:gs pos="97000">
-                    <a:schemeClr val="accent4">
-                      <a:lumMod val="75000"/>
-                    </a:schemeClr>
-                  </a:gs>
-                </a:gsLst>
-                <a:lin ang="2700000" scaled="1"/>
-              </a:gradFill>
-              <a:ln w="19050">
-                <a:noFill/>
-              </a:ln>
-              <a:effectLst/>
-            </c:spPr>
-            <c:extLst>
-              <c:ext xmlns:c16="http://schemas.microsoft.com/office/drawing/2014/chart" uri="{C3380CC4-5D6E-409C-BE32-E72D297353CC}">
-                <c16:uniqueId val="{00000001-8168-4E95-81EF-FFCA5ACEA39A}"/>
-              </c:ext>
-            </c:extLst>
-          </c:dPt>
-          <c:dPt>
-            <c:idx val="1"/>
-            <c:bubble3D val="0"/>
-            <c:spPr>
-              <a:solidFill>
-                <a:schemeClr val="accent5"/>
-              </a:solidFill>
-              <a:ln w="19050">
-                <a:noFill/>
-              </a:ln>
-              <a:effectLst/>
-            </c:spPr>
-            <c:extLst>
-              <c:ext xmlns:c16="http://schemas.microsoft.com/office/drawing/2014/chart" uri="{C3380CC4-5D6E-409C-BE32-E72D297353CC}">
-                <c16:uniqueId val="{00000003-8168-4E95-81EF-FFCA5ACEA39A}"/>
-              </c:ext>
-            </c:extLst>
-          </c:dPt>
-          <c:dPt>
-            <c:idx val="2"/>
-            <c:bubble3D val="0"/>
-            <c:spPr>
-              <a:gradFill>
-                <a:gsLst>
-                  <a:gs pos="0">
-                    <a:schemeClr val="accent1"/>
-                  </a:gs>
-                  <a:gs pos="99000">
-                    <a:schemeClr val="accent3"/>
-                  </a:gs>
-                </a:gsLst>
-                <a:lin ang="2700000" scaled="1"/>
-              </a:gradFill>
-              <a:ln w="19050">
-                <a:noFill/>
-              </a:ln>
-              <a:effectLst/>
-            </c:spPr>
-            <c:extLst>
-              <c:ext xmlns:c16="http://schemas.microsoft.com/office/drawing/2014/chart" uri="{C3380CC4-5D6E-409C-BE32-E72D297353CC}">
-                <c16:uniqueId val="{00000005-8168-4E95-81EF-FFCA5ACEA39A}"/>
-              </c:ext>
-            </c:extLst>
-          </c:dPt>
-          <c:dPt>
-            <c:idx val="3"/>
-            <c:bubble3D val="0"/>
-            <c:spPr>
-              <a:solidFill>
-                <a:schemeClr val="dk1">
-                  <a:tint val="92000"/>
-                </a:schemeClr>
-              </a:solidFill>
-              <a:ln w="19050">
-                <a:noFill/>
-              </a:ln>
-              <a:effectLst/>
-            </c:spPr>
-            <c:extLst>
-              <c:ext xmlns:c16="http://schemas.microsoft.com/office/drawing/2014/chart" uri="{C3380CC4-5D6E-409C-BE32-E72D297353CC}">
-                <c16:uniqueId val="{00000007-8168-4E95-81EF-FFCA5ACEA39A}"/>
-              </c:ext>
-            </c:extLst>
-          </c:dPt>
-          <c:dPt>
-            <c:idx val="4"/>
-            <c:bubble3D val="0"/>
-            <c:spPr>
-              <a:solidFill>
-                <a:schemeClr val="accent1"/>
-              </a:solidFill>
-              <a:ln w="19050">
-                <a:noFill/>
-              </a:ln>
-              <a:effectLst/>
-            </c:spPr>
-            <c:extLst>
-              <c:ext xmlns:c16="http://schemas.microsoft.com/office/drawing/2014/chart" uri="{C3380CC4-5D6E-409C-BE32-E72D297353CC}">
-                <c16:uniqueId val="{00000009-8168-4E95-81EF-FFCA5ACEA39A}"/>
-              </c:ext>
-            </c:extLst>
-          </c:dPt>
-          <c:cat>
-            <c:strRef>
-              <c:f>Sheet1!$A$2:$A$4</c:f>
-              <c:strCache>
-                <c:ptCount val="3"/>
-                <c:pt idx="0">
-                  <c:v>Kriston-Széles Flórián</c:v>
-                </c:pt>
-                <c:pt idx="1">
-                  <c:v>Krizsai Tamás</c:v>
-                </c:pt>
-                <c:pt idx="2">
-                  <c:v>Kanta Áron</c:v>
-                </c:pt>
-              </c:strCache>
-            </c:strRef>
-          </c:cat>
-          <c:val>
-            <c:numRef>
-              <c:f>Sheet1!$B$2:$B$4</c:f>
-              <c:numCache>
-                <c:formatCode>General</c:formatCode>
-                <c:ptCount val="3"/>
-                <c:pt idx="0">
-                  <c:v>44</c:v>
-                </c:pt>
-                <c:pt idx="1">
-                  <c:v>37</c:v>
-                </c:pt>
-                <c:pt idx="2">
-                  <c:v>19</c:v>
-                </c:pt>
-              </c:numCache>
-            </c:numRef>
-          </c:val>
-          <c:extLst>
-            <c:ext xmlns:c16="http://schemas.microsoft.com/office/drawing/2014/chart" uri="{C3380CC4-5D6E-409C-BE32-E72D297353CC}">
-              <c16:uniqueId val="{00000000-7670-4AC1-8BA7-147D1D083F79}"/>
-            </c:ext>
-          </c:extLst>
-        </c:ser>
-        <c:dLbls>
-          <c:showLegendKey val="0"/>
-          <c:showVal val="0"/>
-          <c:showCatName val="0"/>
-          <c:showSerName val="0"/>
-          <c:showPercent val="0"/>
-          <c:showBubbleSize val="0"/>
-          <c:showLeaderLines val="1"/>
-        </c:dLbls>
-        <c:firstSliceAng val="0"/>
-        <c:holeSize val="50"/>
-      </c:doughnutChart>
-      <c:spPr>
-        <a:noFill/>
-        <a:ln>
-          <a:noFill/>
-        </a:ln>
-        <a:effectLst/>
-      </c:spPr>
-    </c:plotArea>
-    <c:legend>
-      <c:legendPos val="r"/>
-      <c:overlay val="0"/>
-      <c:spPr>
-        <a:noFill/>
-        <a:ln>
-          <a:noFill/>
-        </a:ln>
-        <a:effectLst/>
-      </c:spPr>
-      <c:txPr>
-        <a:bodyPr rot="0" spcFirstLastPara="1" vertOverflow="ellipsis" vert="horz" wrap="square" anchor="ctr" anchorCtr="1"/>
-        <a:lstStyle/>
-        <a:p>
-          <a:pPr>
-            <a:defRPr sz="1197" b="0" i="0" u="none" strike="noStrike" kern="1200" baseline="0">
-              <a:solidFill>
-                <a:schemeClr val="tx1"/>
-              </a:solidFill>
-              <a:latin typeface="+mn-lt"/>
-              <a:ea typeface="+mn-ea"/>
-              <a:cs typeface="+mn-cs"/>
-            </a:defRPr>
-          </a:pPr>
-          <a:endParaRPr lang="hu-HU"/>
-        </a:p>
-      </c:txPr>
-    </c:legend>
-    <c:plotVisOnly val="1"/>
-    <c:dispBlanksAs val="gap"/>
-    <c:extLst>
-      <c:ext xmlns:c16r3="http://schemas.microsoft.com/office/drawing/2017/03/chart" uri="{56B9EC1D-385E-4148-901F-78D8002777C0}">
-        <c16r3:dataDisplayOptions16>
-          <c16r3:dispNaAsBlank val="1"/>
-        </c16r3:dataDisplayOptions16>
-      </c:ext>
-    </c:extLst>
-    <c:showDLblsOverMax val="0"/>
-  </c:chart>
-  <c:spPr>
-    <a:noFill/>
-    <a:ln>
-      <a:noFill/>
-    </a:ln>
-    <a:effectLst/>
-  </c:spPr>
-  <c:txPr>
-    <a:bodyPr/>
-    <a:lstStyle/>
-    <a:p>
-      <a:pPr>
-        <a:defRPr>
-          <a:solidFill>
-            <a:schemeClr val="tx1"/>
-          </a:solidFill>
-        </a:defRPr>
-      </a:pPr>
-      <a:endParaRPr lang="hu-HU"/>
-    </a:p>
-  </c:txPr>
-  <c:externalData r:id="rId3">
-    <c:autoUpdate val="0"/>
-  </c:externalData>
-</c:chartSpace>
-</file>
-
-<file path=ppt/charts/colors1.xml><?xml version="1.0" encoding="utf-8"?>
-<cs:colorStyle xmlns:cs="http://schemas.microsoft.com/office/drawing/2012/chartStyle" xmlns:a="http://schemas.openxmlformats.org/drawingml/2006/main" meth="acrossLinear" id="1">
-  <a:schemeClr val="dk1">
-    <a:tint val="88000"/>
-  </a:schemeClr>
-  <a:schemeClr val="dk1">
-    <a:tint val="55000"/>
-  </a:schemeClr>
-  <a:schemeClr val="dk1">
-    <a:tint val="78000"/>
-  </a:schemeClr>
-  <a:schemeClr val="dk1">
-    <a:tint val="92000"/>
-  </a:schemeClr>
-  <a:schemeClr val="dk1">
-    <a:tint val="70000"/>
-  </a:schemeClr>
-  <a:schemeClr val="dk1">
-    <a:tint val="30000"/>
-  </a:schemeClr>
-</cs:colorStyle>
-</file>
-
-<file path=ppt/charts/style1.xml><?xml version="1.0" encoding="utf-8"?>
-<cs:chartStyle xmlns:cs="http://schemas.microsoft.com/office/drawing/2012/chartStyle" xmlns:a="http://schemas.openxmlformats.org/drawingml/2006/main" id="333">
-  <cs:axisTitle>
-    <cs:lnRef idx="0"/>
-    <cs:fillRef idx="0"/>
-    <cs:effectRef idx="0"/>
-    <cs:fontRef idx="minor">
-      <a:schemeClr val="tx1">
-        <a:lumMod val="65000"/>
-        <a:lumOff val="35000"/>
-      </a:schemeClr>
-    </cs:fontRef>
-    <cs:defRPr sz="1197" kern="1200"/>
-  </cs:axisTitle>
-  <cs:categoryAxis>
-    <cs:lnRef idx="0"/>
-    <cs:fillRef idx="0"/>
-    <cs:effectRef idx="0"/>
-    <cs:fontRef idx="minor">
-      <a:schemeClr val="tx1">
-        <a:lumMod val="65000"/>
-        <a:lumOff val="35000"/>
-      </a:schemeClr>
-    </cs:fontRef>
-    <cs:spPr>
-      <a:ln w="9525" cap="flat" cmpd="sng" algn="ctr">
-        <a:solidFill>
-          <a:schemeClr val="tx1">
-            <a:lumMod val="15000"/>
-            <a:lumOff val="85000"/>
-          </a:schemeClr>
-        </a:solidFill>
-        <a:round/>
-      </a:ln>
-    </cs:spPr>
-    <cs:defRPr sz="1197" kern="1200"/>
-  </cs:categoryAxis>
-  <cs:chartArea mods="allowNoFillOverride allowNoLineOverride">
-    <cs:lnRef idx="0"/>
-    <cs:fillRef idx="0"/>
-    <cs:effectRef idx="0"/>
-    <cs:fontRef idx="minor">
-      <a:schemeClr val="tx1"/>
-    </cs:fontRef>
-    <cs:spPr>
-      <a:solidFill>
-        <a:schemeClr val="bg1"/>
-      </a:solidFill>
-      <a:ln w="9525" cap="flat" cmpd="sng" algn="ctr">
-        <a:solidFill>
-          <a:schemeClr val="tx1">
-            <a:lumMod val="15000"/>
-            <a:lumOff val="85000"/>
-          </a:schemeClr>
-        </a:solidFill>
-        <a:round/>
-      </a:ln>
-    </cs:spPr>
-    <cs:defRPr sz="1197" kern="1200"/>
-  </cs:chartArea>
-  <cs:dataLabel>
-    <cs:lnRef idx="0"/>
-    <cs:fillRef idx="0"/>
-    <cs:effectRef idx="0"/>
-    <cs:fontRef idx="minor">
-      <a:schemeClr val="tx1">
-        <a:lumMod val="65000"/>
-        <a:lumOff val="35000"/>
-      </a:schemeClr>
-    </cs:fontRef>
-    <cs:defRPr sz="1197" kern="1200"/>
-  </cs:dataLabel>
-  <cs:dataLabelCallout>
-    <cs:lnRef idx="0"/>
-    <cs:fillRef idx="0"/>
-    <cs:effectRef idx="0"/>
-    <cs:fontRef idx="minor">
-      <a:schemeClr val="dk1">
-        <a:lumMod val="65000"/>
-        <a:lumOff val="35000"/>
-      </a:schemeClr>
-    </cs:fontRef>
-    <cs:spPr>
-      <a:solidFill>
-        <a:schemeClr val="lt1"/>
-      </a:solidFill>
-      <a:ln>
-        <a:solidFill>
-          <a:schemeClr val="dk1">
-            <a:lumMod val="50000"/>
-            <a:lumOff val="50000"/>
-          </a:schemeClr>
-        </a:solidFill>
-      </a:ln>
-    </cs:spPr>
-    <cs:defRPr sz="1197" kern="1200"/>
-    <cs:bodyPr rot="0" spcFirstLastPara="1" vertOverflow="clip" horzOverflow="clip" vert="horz" wrap="square" lIns="36576" tIns="18288" rIns="36576" bIns="18288" anchor="ctr" anchorCtr="1">
-      <a:spAutoFit/>
-    </cs:bodyPr>
-  </cs:dataLabelCallout>
-  <cs:dataPoint>
-    <cs:lnRef idx="0"/>
-    <cs:fillRef idx="0">
-      <cs:styleClr val="auto"/>
-    </cs:fillRef>
-    <cs:effectRef idx="0"/>
-    <cs:fontRef idx="minor">
-      <a:schemeClr val="tx1"/>
-    </cs:fontRef>
-    <cs:spPr>
-      <a:solidFill>
-        <a:schemeClr val="phClr"/>
-      </a:solidFill>
-      <a:ln w="19050">
-        <a:solidFill>
-          <a:schemeClr val="lt1"/>
-        </a:solidFill>
-      </a:ln>
-    </cs:spPr>
-  </cs:dataPoint>
-  <cs:dataPoint3D>
-    <cs:lnRef idx="0"/>
-    <cs:fillRef idx="0">
-      <cs:styleClr val="auto"/>
-    </cs:fillRef>
-    <cs:effectRef idx="0"/>
-    <cs:fontRef idx="minor">
-      <a:schemeClr val="tx1"/>
-    </cs:fontRef>
-    <cs:spPr>
-      <a:solidFill>
-        <a:schemeClr val="phClr"/>
-      </a:solidFill>
-      <a:ln w="19050">
-        <a:solidFill>
-          <a:schemeClr val="lt1"/>
-        </a:solidFill>
-      </a:ln>
-    </cs:spPr>
-  </cs:dataPoint3D>
-  <cs:dataPointLine>
-    <cs:lnRef idx="0">
-      <cs:styleClr val="auto"/>
-    </cs:lnRef>
-    <cs:fillRef idx="0"/>
-    <cs:effectRef idx="0"/>
-    <cs:fontRef idx="minor">
-      <a:schemeClr val="tx1"/>
-    </cs:fontRef>
-    <cs:spPr>
-      <a:ln w="28575" cap="rnd">
-        <a:solidFill>
-          <a:schemeClr val="phClr"/>
-        </a:solidFill>
-        <a:round/>
-      </a:ln>
-    </cs:spPr>
-  </cs:dataPointLine>
-  <cs:dataPointMarker>
-    <cs:lnRef idx="0"/>
-    <cs:fillRef idx="0">
-      <cs:styleClr val="auto"/>
-    </cs:fillRef>
-    <cs:effectRef idx="0"/>
-    <cs:fontRef idx="minor">
-      <a:schemeClr val="tx1"/>
-    </cs:fontRef>
-    <cs:spPr>
-      <a:solidFill>
-        <a:schemeClr val="phClr"/>
-      </a:solidFill>
-      <a:ln w="9525">
-        <a:solidFill>
-          <a:schemeClr val="lt1"/>
-        </a:solidFill>
-      </a:ln>
-    </cs:spPr>
-  </cs:dataPointMarker>
-  <cs:dataPointMarkerLayout symbol="circle" size="6"/>
-  <cs:dataPointWireframe>
-    <cs:lnRef idx="0">
-      <cs:styleClr val="auto"/>
-    </cs:lnRef>
-    <cs:fillRef idx="0"/>
-    <cs:effectRef idx="0"/>
-    <cs:fontRef idx="minor">
-      <a:schemeClr val="tx1"/>
-    </cs:fontRef>
-    <cs:spPr>
-      <a:ln w="9525" cap="rnd">
-        <a:solidFill>
-          <a:schemeClr val="phClr"/>
-        </a:solidFill>
-        <a:round/>
-      </a:ln>
-    </cs:spPr>
-  </cs:dataPointWireframe>
-  <cs:dataTable>
-    <cs:lnRef idx="0"/>
-    <cs:fillRef idx="0"/>
-    <cs:effectRef idx="0"/>
-    <cs:fontRef idx="minor">
-      <a:schemeClr val="tx1">
-        <a:lumMod val="65000"/>
-        <a:lumOff val="35000"/>
-      </a:schemeClr>
-    </cs:fontRef>
-    <cs:spPr>
-      <a:noFill/>
-      <a:ln w="9525" cap="flat" cmpd="sng" algn="ctr">
-        <a:solidFill>
-          <a:schemeClr val="tx1">
-            <a:lumMod val="15000"/>
-            <a:lumOff val="85000"/>
-          </a:schemeClr>
-        </a:solidFill>
-        <a:round/>
-      </a:ln>
-    </cs:spPr>
-    <cs:defRPr sz="1197" kern="1200"/>
-  </cs:dataTable>
-  <cs:downBar>
-    <cs:lnRef idx="0"/>
-    <cs:fillRef idx="0"/>
-    <cs:effectRef idx="0"/>
-    <cs:fontRef idx="minor">
-      <a:schemeClr val="tx1"/>
-    </cs:fontRef>
-    <cs:spPr>
-      <a:solidFill>
-        <a:schemeClr val="dk1">
-          <a:lumMod val="75000"/>
-          <a:lumOff val="25000"/>
-        </a:schemeClr>
-      </a:solidFill>
-      <a:ln w="9525" cap="flat" cmpd="sng" algn="ctr">
-        <a:solidFill>
-          <a:schemeClr val="tx1">
-            <a:lumMod val="65000"/>
-            <a:lumOff val="35000"/>
-          </a:schemeClr>
-        </a:solidFill>
-        <a:round/>
-      </a:ln>
-    </cs:spPr>
-  </cs:downBar>
-  <cs:dropLine>
-    <cs:lnRef idx="0"/>
-    <cs:fillRef idx="0"/>
-    <cs:effectRef idx="0"/>
-    <cs:fontRef idx="minor">
-      <a:schemeClr val="tx1"/>
-    </cs:fontRef>
-    <cs:spPr>
-      <a:ln w="9525" cap="flat" cmpd="sng" algn="ctr">
-        <a:solidFill>
-          <a:schemeClr val="tx1">
-            <a:lumMod val="35000"/>
-            <a:lumOff val="65000"/>
-          </a:schemeClr>
-        </a:solidFill>
-        <a:round/>
-      </a:ln>
-    </cs:spPr>
-  </cs:dropLine>
-  <cs:errorBar>
-    <cs:lnRef idx="0"/>
-    <cs:fillRef idx="0"/>
-    <cs:effectRef idx="0"/>
-    <cs:fontRef idx="minor">
-      <a:schemeClr val="tx1"/>
-    </cs:fontRef>
-    <cs:spPr>
-      <a:ln w="9525" cap="flat" cmpd="sng" algn="ctr">
-        <a:solidFill>
-          <a:schemeClr val="tx1">
-            <a:lumMod val="65000"/>
-            <a:lumOff val="35000"/>
-          </a:schemeClr>
-        </a:solidFill>
-        <a:round/>
-      </a:ln>
-    </cs:spPr>
-  </cs:errorBar>
-  <cs:floor>
-    <cs:lnRef idx="0"/>
-    <cs:fillRef idx="0"/>
-    <cs:effectRef idx="0"/>
-    <cs:fontRef idx="minor">
-      <a:schemeClr val="tx1"/>
-    </cs:fontRef>
-    <cs:spPr>
-      <a:noFill/>
-      <a:ln>
-        <a:noFill/>
-      </a:ln>
-    </cs:spPr>
-  </cs:floor>
-  <cs:gridlineMajor>
-    <cs:lnRef idx="0"/>
-    <cs:fillRef idx="0"/>
-    <cs:effectRef idx="0"/>
-    <cs:fontRef idx="minor">
-      <a:schemeClr val="tx1"/>
-    </cs:fontRef>
-    <cs:spPr>
-      <a:ln w="9525" cap="flat" cmpd="sng" algn="ctr">
-        <a:solidFill>
-          <a:schemeClr val="tx1">
-            <a:lumMod val="15000"/>
-            <a:lumOff val="85000"/>
-          </a:schemeClr>
-        </a:solidFill>
-        <a:round/>
-      </a:ln>
-    </cs:spPr>
-  </cs:gridlineMajor>
-  <cs:gridlineMinor>
-    <cs:lnRef idx="0"/>
-    <cs:fillRef idx="0"/>
-    <cs:effectRef idx="0"/>
-    <cs:fontRef idx="minor">
-      <a:schemeClr val="tx1"/>
-    </cs:fontRef>
-    <cs:spPr>
-      <a:ln w="9525" cap="flat" cmpd="sng" algn="ctr">
-        <a:solidFill>
-          <a:schemeClr val="tx1">
-            <a:lumMod val="5000"/>
-            <a:lumOff val="95000"/>
-          </a:schemeClr>
-        </a:solidFill>
-        <a:round/>
-      </a:ln>
-    </cs:spPr>
-  </cs:gridlineMinor>
-  <cs:hiLoLine>
-    <cs:lnRef idx="0"/>
-    <cs:fillRef idx="0"/>
-    <cs:effectRef idx="0"/>
-    <cs:fontRef idx="minor">
-      <a:schemeClr val="tx1"/>
-    </cs:fontRef>
-    <cs:spPr>
-      <a:ln w="9525" cap="flat" cmpd="sng" algn="ctr">
-        <a:solidFill>
-          <a:schemeClr val="tx1">
-            <a:lumMod val="50000"/>
-            <a:lumOff val="50000"/>
-          </a:schemeClr>
-        </a:solidFill>
-        <a:round/>
-      </a:ln>
-    </cs:spPr>
-  </cs:hiLoLine>
-  <cs:leaderLine>
-    <cs:lnRef idx="0"/>
-    <cs:fillRef idx="0"/>
-    <cs:effectRef idx="0"/>
-    <cs:fontRef idx="minor">
-      <a:schemeClr val="tx1"/>
-    </cs:fontRef>
-    <cs:spPr>
-      <a:ln w="9525" cap="flat" cmpd="sng" algn="ctr">
-        <a:solidFill>
-          <a:schemeClr val="tx1">
-            <a:lumMod val="35000"/>
-            <a:lumOff val="65000"/>
-          </a:schemeClr>
-        </a:solidFill>
-        <a:round/>
-      </a:ln>
-    </cs:spPr>
-  </cs:leaderLine>
-  <cs:legend>
-    <cs:lnRef idx="0"/>
-    <cs:fillRef idx="0"/>
-    <cs:effectRef idx="0"/>
-    <cs:fontRef idx="minor">
-      <a:schemeClr val="tx1">
-        <a:lumMod val="65000"/>
-        <a:lumOff val="35000"/>
-      </a:schemeClr>
-    </cs:fontRef>
-    <cs:defRPr sz="1197" kern="1200"/>
-  </cs:legend>
-  <cs:plotArea mods="allowNoFillOverride allowNoLineOverride">
-    <cs:lnRef idx="0"/>
-    <cs:fillRef idx="0"/>
-    <cs:effectRef idx="0"/>
-    <cs:fontRef idx="minor">
-      <a:schemeClr val="tx1"/>
-    </cs:fontRef>
-  </cs:plotArea>
-  <cs:plotArea3D mods="allowNoFillOverride allowNoLineOverride">
-    <cs:lnRef idx="0"/>
-    <cs:fillRef idx="0"/>
-    <cs:effectRef idx="0"/>
-    <cs:fontRef idx="minor">
-      <a:schemeClr val="tx1"/>
-    </cs:fontRef>
-  </cs:plotArea3D>
-  <cs:seriesAxis>
-    <cs:lnRef idx="0"/>
-    <cs:fillRef idx="0"/>
-    <cs:effectRef idx="0"/>
-    <cs:fontRef idx="minor">
-      <a:schemeClr val="tx1">
-        <a:lumMod val="65000"/>
-        <a:lumOff val="35000"/>
-      </a:schemeClr>
-    </cs:fontRef>
-    <cs:defRPr sz="1197" kern="1200"/>
-  </cs:seriesAxis>
-  <cs:seriesLine>
-    <cs:lnRef idx="0"/>
-    <cs:fillRef idx="0"/>
-    <cs:effectRef idx="0"/>
-    <cs:fontRef idx="minor">
-      <a:schemeClr val="tx1"/>
-    </cs:fontRef>
-    <cs:spPr>
-      <a:ln w="9525" cap="flat" cmpd="sng" algn="ctr">
-        <a:solidFill>
-          <a:schemeClr val="tx1">
-            <a:lumMod val="35000"/>
-            <a:lumOff val="65000"/>
-          </a:schemeClr>
-        </a:solidFill>
-        <a:round/>
-      </a:ln>
-    </cs:spPr>
-  </cs:seriesLine>
-  <cs:title>
-    <cs:lnRef idx="0"/>
-    <cs:fillRef idx="0"/>
-    <cs:effectRef idx="0"/>
-    <cs:fontRef idx="minor">
-      <a:schemeClr val="tx1">
-        <a:lumMod val="65000"/>
-        <a:lumOff val="35000"/>
-      </a:schemeClr>
-    </cs:fontRef>
-    <cs:defRPr sz="1915" b="0" kern="1200" spc="0" baseline="0"/>
-  </cs:title>
-  <cs:trendline>
-    <cs:lnRef idx="0">
-      <cs:styleClr val="auto"/>
-    </cs:lnRef>
-    <cs:fillRef idx="0"/>
-    <cs:effectRef idx="0"/>
-    <cs:fontRef idx="minor">
-      <a:schemeClr val="tx1"/>
-    </cs:fontRef>
-    <cs:spPr>
-      <a:ln w="19050" cap="rnd">
-        <a:solidFill>
-          <a:schemeClr val="phClr"/>
-        </a:solidFill>
-        <a:prstDash val="sysDash"/>
-      </a:ln>
-    </cs:spPr>
-  </cs:trendline>
-  <cs:trendlineLabel>
-    <cs:lnRef idx="0"/>
-    <cs:fillRef idx="0"/>
-    <cs:effectRef idx="0"/>
-    <cs:fontRef idx="minor">
-      <a:schemeClr val="tx1">
-        <a:lumMod val="65000"/>
-        <a:lumOff val="35000"/>
-      </a:schemeClr>
-    </cs:fontRef>
-    <cs:defRPr sz="1197" kern="1200"/>
-  </cs:trendlineLabel>
-  <cs:upBar>
-    <cs:lnRef idx="0"/>
-    <cs:fillRef idx="0"/>
-    <cs:effectRef idx="0"/>
-    <cs:fontRef idx="minor">
-      <a:schemeClr val="tx1"/>
-    </cs:fontRef>
-    <cs:spPr>
-      <a:solidFill>
-        <a:schemeClr val="lt1"/>
-      </a:solidFill>
-      <a:ln w="9525" cap="flat" cmpd="sng" algn="ctr">
-        <a:solidFill>
-          <a:schemeClr val="tx1">
-            <a:lumMod val="65000"/>
-            <a:lumOff val="35000"/>
-          </a:schemeClr>
-        </a:solidFill>
-        <a:round/>
-      </a:ln>
-    </cs:spPr>
-  </cs:upBar>
-  <cs:valueAxis>
-    <cs:lnRef idx="0"/>
-    <cs:fillRef idx="0"/>
-    <cs:effectRef idx="0"/>
-    <cs:fontRef idx="minor">
-      <a:schemeClr val="tx1">
-        <a:lumMod val="65000"/>
-        <a:lumOff val="35000"/>
-      </a:schemeClr>
-    </cs:fontRef>
-    <cs:defRPr sz="1197" kern="1200"/>
-  </cs:valueAxis>
-  <cs:wall>
-    <cs:lnRef idx="0"/>
-    <cs:fillRef idx="0"/>
-    <cs:effectRef idx="0"/>
-    <cs:fontRef idx="minor">
-      <a:schemeClr val="tx1"/>
-    </cs:fontRef>
-    <cs:spPr>
-      <a:noFill/>
-      <a:ln>
-        <a:noFill/>
-      </a:ln>
-    </cs:spPr>
-  </cs:wall>
-</cs:chartStyle>
-</file>
-
 <file path=ppt/handoutMasters/handoutMaster1.xml><?xml version="1.0" encoding="utf-8"?>
 <p:handoutMaster xmlns:a="http://schemas.openxmlformats.org/drawingml/2006/main" xmlns:r="http://schemas.openxmlformats.org/officeDocument/2006/relationships" xmlns:p="http://schemas.openxmlformats.org/presentationml/2006/main">
   <p:cSld>
@@ -1038,7 +222,7 @@
           <a:p>
             <a:fld id="{0AD3DE1A-2241-45DA-954B-4A1CB50EE7E1}" type="datetimeFigureOut">
               <a:rPr lang="hu-HU" smtClean="0"/>
-              <a:t>2025. 03. 27.</a:t>
+              <a:t>2025. 03. 28.</a:t>
             </a:fld>
             <a:endParaRPr lang="hu-HU"/>
           </a:p>
@@ -1216,7 +400,7 @@
           <a:p>
             <a:fld id="{97B157C7-EA57-4A28-9B4E-427CDD8FDBDF}" type="datetimeFigureOut">
               <a:rPr lang="hu-HU" noProof="0" smtClean="0"/>
-              <a:t>2025. 03. 27.</a:t>
+              <a:t>2025. 03. 28.</a:t>
             </a:fld>
             <a:endParaRPr lang="hu-HU" noProof="0"/>
           </a:p>
@@ -1801,7 +985,7 @@
           <a:p>
             <a:fld id="{E72825A0-BAE9-473A-A056-FD986C8B0900}" type="slidenum">
               <a:rPr lang="hu-HU" noProof="0" smtClean="0"/>
-              <a:t>5</a:t>
+              <a:t>7</a:t>
             </a:fld>
             <a:endParaRPr lang="hu-HU" noProof="0"/>
           </a:p>
@@ -1885,7 +1069,7 @@
           <a:p>
             <a:fld id="{E72825A0-BAE9-473A-A056-FD986C8B0900}" type="slidenum">
               <a:rPr lang="hu-HU" noProof="0" smtClean="0"/>
-              <a:t>6</a:t>
+              <a:t>8</a:t>
             </a:fld>
             <a:endParaRPr lang="hu-HU" noProof="0"/>
           </a:p>
@@ -2075,7 +1259,7 @@
             <a:pPr rtl="0"/>
             <a:fld id="{8722D6C1-A2FD-45AC-A538-FCE9A6401F42}" type="datetime1">
               <a:rPr lang="hu-HU" noProof="0" smtClean="0"/>
-              <a:t>2025. 03. 27.</a:t>
+              <a:t>2025. 03. 28.</a:t>
             </a:fld>
             <a:endParaRPr lang="hu-HU" noProof="0"/>
           </a:p>
@@ -2349,7 +1533,7 @@
             <a:pPr rtl="0"/>
             <a:fld id="{C2CD5ED6-9936-4E53-BDEE-012FAF83479A}" type="datetime1">
               <a:rPr lang="hu-HU" noProof="0" smtClean="0"/>
-              <a:t>2025. 03. 27.</a:t>
+              <a:t>2025. 03. 28.</a:t>
             </a:fld>
             <a:endParaRPr lang="hu-HU" noProof="0"/>
           </a:p>
@@ -2588,7 +1772,7 @@
             <a:pPr rtl="0"/>
             <a:fld id="{D7B0B103-54F9-4700-86B8-803916FCFD73}" type="datetime1">
               <a:rPr lang="hu-HU" noProof="0" smtClean="0"/>
-              <a:t>2025. 03. 27.</a:t>
+              <a:t>2025. 03. 28.</a:t>
             </a:fld>
             <a:endParaRPr lang="hu-HU" noProof="0"/>
           </a:p>
@@ -2906,7 +2090,7 @@
             <a:pPr rtl="0"/>
             <a:fld id="{BEF47BD2-A5D7-47AF-80DF-503B159DF1E0}" type="datetime1">
               <a:rPr lang="hu-HU" noProof="0" smtClean="0"/>
-              <a:t>2025. 03. 27.</a:t>
+              <a:t>2025. 03. 28.</a:t>
             </a:fld>
             <a:endParaRPr lang="hu-HU" noProof="0"/>
           </a:p>
@@ -3387,7 +2571,7 @@
             <a:pPr rtl="0"/>
             <a:fld id="{A77D77DC-4028-4DFA-A617-124FE0632CFD}" type="datetime1">
               <a:rPr lang="hu-HU" noProof="0" smtClean="0"/>
-              <a:t>2025. 03. 27.</a:t>
+              <a:t>2025. 03. 28.</a:t>
             </a:fld>
             <a:endParaRPr lang="hu-HU" noProof="0"/>
           </a:p>
@@ -3942,7 +3126,7 @@
             <a:pPr rtl="0"/>
             <a:fld id="{D8DC576A-9893-48E8-AD4C-A5E2563C8FBE}" type="datetime1">
               <a:rPr lang="hu-HU" noProof="0" smtClean="0"/>
-              <a:t>2025. 03. 27.</a:t>
+              <a:t>2025. 03. 28.</a:t>
             </a:fld>
             <a:endParaRPr lang="hu-HU" noProof="0"/>
           </a:p>
@@ -4724,7 +3908,7 @@
             <a:pPr rtl="0"/>
             <a:fld id="{497E3476-FC43-404D-8C09-460EF139B478}" type="datetime1">
               <a:rPr lang="hu-HU" noProof="0" smtClean="0"/>
-              <a:t>2025. 03. 27.</a:t>
+              <a:t>2025. 03. 28.</a:t>
             </a:fld>
             <a:endParaRPr lang="hu-HU" noProof="0"/>
           </a:p>
@@ -4906,7 +4090,7 @@
             <a:pPr rtl="0"/>
             <a:fld id="{0CB34953-DD07-4A3B-B33E-D5C651C3BE02}" type="datetime1">
               <a:rPr lang="hu-HU" noProof="0" smtClean="0"/>
-              <a:t>2025. 03. 27.</a:t>
+              <a:t>2025. 03. 28.</a:t>
             </a:fld>
             <a:endParaRPr lang="hu-HU" noProof="0"/>
           </a:p>
@@ -5135,7 +4319,7 @@
             <a:pPr rtl="0"/>
             <a:fld id="{3759C7DD-A91D-4706-8584-33B8614A085C}" type="datetime1">
               <a:rPr lang="hu-HU" noProof="0" smtClean="0"/>
-              <a:t>2025. 03. 27.</a:t>
+              <a:t>2025. 03. 28.</a:t>
             </a:fld>
             <a:endParaRPr lang="hu-HU" noProof="0"/>
           </a:p>
@@ -5321,7 +4505,7 @@
             <a:pPr rtl="0"/>
             <a:fld id="{F169964A-3DCD-4016-9803-1FE60F631006}" type="datetime1">
               <a:rPr lang="hu-HU" noProof="0" smtClean="0"/>
-              <a:t>2025. 03. 27.</a:t>
+              <a:t>2025. 03. 28.</a:t>
             </a:fld>
             <a:endParaRPr lang="hu-HU" noProof="0"/>
           </a:p>
@@ -5617,7 +4801,7 @@
             <a:pPr rtl="0"/>
             <a:fld id="{14C94FBE-12F4-446E-B387-376A7496542D}" type="datetime1">
               <a:rPr lang="hu-HU" noProof="0" smtClean="0"/>
-              <a:t>2025. 03. 27.</a:t>
+              <a:t>2025. 03. 28.</a:t>
             </a:fld>
             <a:endParaRPr lang="hu-HU" noProof="0"/>
           </a:p>
@@ -5864,7 +5048,7 @@
             <a:pPr rtl="0"/>
             <a:fld id="{476027C6-9B6A-43D4-84EA-31BF0C736873}" type="datetime1">
               <a:rPr lang="hu-HU" noProof="0" smtClean="0"/>
-              <a:t>2025. 03. 27.</a:t>
+              <a:t>2025. 03. 28.</a:t>
             </a:fld>
             <a:endParaRPr lang="hu-HU" noProof="0"/>
           </a:p>
@@ -6248,7 +5432,7 @@
             <a:pPr rtl="0"/>
             <a:fld id="{61E764EF-CAD5-4612-B049-2ABFE6F84041}" type="datetime1">
               <a:rPr lang="hu-HU" noProof="0" smtClean="0"/>
-              <a:t>2025. 03. 27.</a:t>
+              <a:t>2025. 03. 28.</a:t>
             </a:fld>
             <a:endParaRPr lang="hu-HU" noProof="0"/>
           </a:p>
@@ -6373,7 +5557,7 @@
             <a:pPr rtl="0"/>
             <a:fld id="{C3066753-3AEE-4AB8-A474-C5ED4EC554CB}" type="datetime1">
               <a:rPr lang="hu-HU" noProof="0" smtClean="0"/>
-              <a:t>2025. 03. 27.</a:t>
+              <a:t>2025. 03. 28.</a:t>
             </a:fld>
             <a:endParaRPr lang="hu-HU" noProof="0"/>
           </a:p>
@@ -6475,7 +5659,7 @@
             <a:pPr rtl="0"/>
             <a:fld id="{C0640860-2E32-442C-9049-2730316D8837}" type="datetime1">
               <a:rPr lang="hu-HU" noProof="0" smtClean="0"/>
-              <a:t>2025. 03. 27.</a:t>
+              <a:t>2025. 03. 28.</a:t>
             </a:fld>
             <a:endParaRPr lang="hu-HU" noProof="0"/>
           </a:p>
@@ -6730,7 +5914,7 @@
             <a:pPr rtl="0"/>
             <a:fld id="{421ABF0A-E69E-4A70-9488-E2045B1FA08F}" type="datetime1">
               <a:rPr lang="hu-HU" noProof="0" smtClean="0"/>
-              <a:t>2025. 03. 27.</a:t>
+              <a:t>2025. 03. 28.</a:t>
             </a:fld>
             <a:endParaRPr lang="hu-HU" noProof="0"/>
           </a:p>
@@ -6994,7 +6178,7 @@
             <a:pPr rtl="0"/>
             <a:fld id="{6CA845CD-F060-4709-9FC0-4CDC42D0AE09}" type="datetime1">
               <a:rPr lang="hu-HU" noProof="0" smtClean="0"/>
-              <a:t>2025. 03. 27.</a:t>
+              <a:t>2025. 03. 28.</a:t>
             </a:fld>
             <a:endParaRPr lang="hu-HU" noProof="0"/>
           </a:p>
@@ -7243,7 +6427,7 @@
             <a:pPr rtl="0"/>
             <a:fld id="{9E27A629-379B-4B9A-8234-4BE692ACD0A5}" type="datetime1">
               <a:rPr lang="hu-HU" noProof="0" smtClean="0"/>
-              <a:t>2025. 03. 27.</a:t>
+              <a:t>2025. 03. 28.</a:t>
             </a:fld>
             <a:endParaRPr lang="hu-HU" noProof="0"/>
           </a:p>
@@ -7735,57 +6919,6 @@
       </p:sp>
       <p:pic>
         <p:nvPicPr>
-          <p:cNvPr id="8" name="Kép 7" descr="Virág">
-            <a:extLst>
-              <a:ext uri="{FF2B5EF4-FFF2-40B4-BE49-F238E27FC236}">
-                <a16:creationId xmlns:a16="http://schemas.microsoft.com/office/drawing/2014/main" id="{3F803F0C-D1ED-48FB-B5CD-1F2FC0FF7CB1}"/>
-              </a:ext>
-            </a:extLst>
-          </p:cNvPr>
-          <p:cNvPicPr>
-            <a:picLocks noChangeAspect="1"/>
-          </p:cNvPicPr>
-          <p:nvPr/>
-        </p:nvPicPr>
-        <p:blipFill rotWithShape="1">
-          <a:blip r:embed="rId3" cstate="print">
-            <a:alphaModFix amt="40000"/>
-            <a:extLst>
-              <a:ext uri="{BEBA8EAE-BF5A-486C-A8C5-ECC9F3942E4B}">
-                <a14:imgProps xmlns:a14="http://schemas.microsoft.com/office/drawing/2010/main">
-                  <a14:imgLayer r:embed="rId4">
-                    <a14:imgEffect>
-                      <a14:artisticPencilSketch/>
-                    </a14:imgEffect>
-                  </a14:imgLayer>
-                </a14:imgProps>
-              </a:ext>
-              <a:ext uri="{28A0092B-C50C-407E-A947-70E740481C1C}">
-                <a14:useLocalDpi xmlns:a14="http://schemas.microsoft.com/office/drawing/2010/main"/>
-              </a:ext>
-            </a:extLst>
-          </a:blip>
-          <a:srcRect l="157" r="157"/>
-          <a:stretch/>
-        </p:blipFill>
-        <p:spPr>
-          <a:xfrm>
-            <a:off x="0" y="-1"/>
-            <a:ext cx="12192000" cy="6858001"/>
-          </a:xfrm>
-          <a:prstGeom prst="rect">
-            <a:avLst/>
-          </a:prstGeom>
-          <a:solidFill>
-            <a:schemeClr val="bg1">
-              <a:lumMod val="85000"/>
-              <a:lumOff val="15000"/>
-            </a:schemeClr>
-          </a:solidFill>
-        </p:spPr>
-      </p:pic>
-      <p:pic>
-        <p:nvPicPr>
           <p:cNvPr id="42" name="Kép 41">
             <a:extLst>
               <a:ext uri="{FF2B5EF4-FFF2-40B4-BE49-F238E27FC236}">
@@ -7808,7 +6941,7 @@
           </p:nvPr>
         </p:nvPicPr>
         <p:blipFill>
-          <a:blip r:embed="rId5">
+          <a:blip r:embed="rId3">
             <a:extLst>
               <a:ext uri="{28A0092B-C50C-407E-A947-70E740481C1C}">
                 <a14:useLocalDpi xmlns:a14="http://schemas.microsoft.com/office/drawing/2010/main" val="0"/>
@@ -7853,7 +6986,7 @@
           </p:nvPr>
         </p:nvPicPr>
         <p:blipFill>
-          <a:blip r:embed="rId6">
+          <a:blip r:embed="rId4">
             <a:extLst>
               <a:ext uri="{28A0092B-C50C-407E-A947-70E740481C1C}">
                 <a14:useLocalDpi xmlns:a14="http://schemas.microsoft.com/office/drawing/2010/main" val="0"/>
@@ -7892,7 +7025,7 @@
         </p:nvSpPr>
         <p:spPr>
           <a:xfrm>
-            <a:off x="1371600" y="3014139"/>
+            <a:off x="1371600" y="1688574"/>
             <a:ext cx="9448800" cy="1825096"/>
           </a:xfrm>
           <a:prstGeom prst="parallelogram">
@@ -7914,7 +7047,7 @@
             </a:r>
             <a:r>
               <a:rPr lang="hu-HU" sz="3800" dirty="0"/>
-              <a:t> vizsgafeladat</a:t>
+              <a:t> Plusz</a:t>
             </a:r>
             <a:endParaRPr lang="hu-HU" sz="3800" b="1" dirty="0"/>
           </a:p>
@@ -7938,7 +7071,7 @@
         </p:nvSpPr>
         <p:spPr>
           <a:xfrm>
-            <a:off x="1371600" y="4842935"/>
+            <a:off x="1371600" y="3760794"/>
             <a:ext cx="9448800" cy="685800"/>
           </a:xfrm>
           <a:prstGeom prst="rect">
@@ -7969,6 +7102,246 @@
   <p:clrMapOvr>
     <a:masterClrMapping/>
   </p:clrMapOvr>
+  <mc:AlternateContent xmlns:mc="http://schemas.openxmlformats.org/markup-compatibility/2006" xmlns:p159="http://schemas.microsoft.com/office/powerpoint/2015/09/main">
+    <mc:Choice Requires="p159">
+      <p:transition xmlns:p14="http://schemas.microsoft.com/office/powerpoint/2010/main" spd="slow" p14:dur="2000">
+        <p159:morph option="byObject"/>
+      </p:transition>
+    </mc:Choice>
+    <mc:Fallback xmlns="">
+      <p:transition spd="slow">
+        <p:fade/>
+      </p:transition>
+    </mc:Fallback>
+  </mc:AlternateContent>
+  <p:timing>
+    <p:tnLst>
+      <p:par>
+        <p:cTn id="1" dur="indefinite" restart="never" nodeType="tmRoot">
+          <p:childTnLst>
+            <p:seq concurrent="1" nextAc="seek">
+              <p:cTn id="2" dur="indefinite" nodeType="mainSeq">
+                <p:childTnLst>
+                  <p:par>
+                    <p:cTn id="3" fill="hold">
+                      <p:stCondLst>
+                        <p:cond delay="indefinite"/>
+                      </p:stCondLst>
+                      <p:childTnLst>
+                        <p:par>
+                          <p:cTn id="4" fill="hold">
+                            <p:stCondLst>
+                              <p:cond delay="0"/>
+                            </p:stCondLst>
+                            <p:childTnLst>
+                              <p:par>
+                                <p:cTn id="5" presetID="2" presetClass="entr" presetSubtype="4" fill="hold" grpId="0" nodeType="clickEffect">
+                                  <p:stCondLst>
+                                    <p:cond delay="0"/>
+                                  </p:stCondLst>
+                                  <p:childTnLst>
+                                    <p:set>
+                                      <p:cBhvr>
+                                        <p:cTn id="6" dur="1" fill="hold">
+                                          <p:stCondLst>
+                                            <p:cond delay="0"/>
+                                          </p:stCondLst>
+                                        </p:cTn>
+                                        <p:tgtEl>
+                                          <p:spTgt spid="2"/>
+                                        </p:tgtEl>
+                                        <p:attrNameLst>
+                                          <p:attrName>style.visibility</p:attrName>
+                                        </p:attrNameLst>
+                                      </p:cBhvr>
+                                      <p:to>
+                                        <p:strVal val="visible"/>
+                                      </p:to>
+                                    </p:set>
+                                    <p:anim calcmode="lin" valueType="num">
+                                      <p:cBhvr additive="base">
+                                        <p:cTn id="7" dur="500" fill="hold"/>
+                                        <p:tgtEl>
+                                          <p:spTgt spid="2"/>
+                                        </p:tgtEl>
+                                        <p:attrNameLst>
+                                          <p:attrName>ppt_x</p:attrName>
+                                        </p:attrNameLst>
+                                      </p:cBhvr>
+                                      <p:tavLst>
+                                        <p:tav tm="0">
+                                          <p:val>
+                                            <p:strVal val="#ppt_x"/>
+                                          </p:val>
+                                        </p:tav>
+                                        <p:tav tm="100000">
+                                          <p:val>
+                                            <p:strVal val="#ppt_x"/>
+                                          </p:val>
+                                        </p:tav>
+                                      </p:tavLst>
+                                    </p:anim>
+                                    <p:anim calcmode="lin" valueType="num">
+                                      <p:cBhvr additive="base">
+                                        <p:cTn id="8" dur="500" fill="hold"/>
+                                        <p:tgtEl>
+                                          <p:spTgt spid="2"/>
+                                        </p:tgtEl>
+                                        <p:attrNameLst>
+                                          <p:attrName>ppt_y</p:attrName>
+                                        </p:attrNameLst>
+                                      </p:cBhvr>
+                                      <p:tavLst>
+                                        <p:tav tm="0">
+                                          <p:val>
+                                            <p:strVal val="1+#ppt_h/2"/>
+                                          </p:val>
+                                        </p:tav>
+                                        <p:tav tm="100000">
+                                          <p:val>
+                                            <p:strVal val="#ppt_y"/>
+                                          </p:val>
+                                        </p:tav>
+                                      </p:tavLst>
+                                    </p:anim>
+                                  </p:childTnLst>
+                                </p:cTn>
+                              </p:par>
+                            </p:childTnLst>
+                          </p:cTn>
+                        </p:par>
+                      </p:childTnLst>
+                    </p:cTn>
+                  </p:par>
+                  <p:par>
+                    <p:cTn id="9" fill="hold">
+                      <p:stCondLst>
+                        <p:cond delay="indefinite"/>
+                      </p:stCondLst>
+                      <p:childTnLst>
+                        <p:par>
+                          <p:cTn id="10" fill="hold">
+                            <p:stCondLst>
+                              <p:cond delay="0"/>
+                            </p:stCondLst>
+                            <p:childTnLst>
+                              <p:par>
+                                <p:cTn id="11" presetID="2" presetClass="entr" presetSubtype="4" fill="hold" grpId="0" nodeType="clickEffect">
+                                  <p:stCondLst>
+                                    <p:cond delay="0"/>
+                                  </p:stCondLst>
+                                  <p:childTnLst>
+                                    <p:set>
+                                      <p:cBhvr>
+                                        <p:cTn id="12" dur="1" fill="hold">
+                                          <p:stCondLst>
+                                            <p:cond delay="0"/>
+                                          </p:stCondLst>
+                                        </p:cTn>
+                                        <p:tgtEl>
+                                          <p:spTgt spid="3">
+                                            <p:txEl>
+                                              <p:pRg st="0" end="0"/>
+                                            </p:txEl>
+                                          </p:spTgt>
+                                        </p:tgtEl>
+                                        <p:attrNameLst>
+                                          <p:attrName>style.visibility</p:attrName>
+                                        </p:attrNameLst>
+                                      </p:cBhvr>
+                                      <p:to>
+                                        <p:strVal val="visible"/>
+                                      </p:to>
+                                    </p:set>
+                                    <p:anim calcmode="lin" valueType="num">
+                                      <p:cBhvr additive="base">
+                                        <p:cTn id="13" dur="500" fill="hold"/>
+                                        <p:tgtEl>
+                                          <p:spTgt spid="3">
+                                            <p:txEl>
+                                              <p:pRg st="0" end="0"/>
+                                            </p:txEl>
+                                          </p:spTgt>
+                                        </p:tgtEl>
+                                        <p:attrNameLst>
+                                          <p:attrName>ppt_x</p:attrName>
+                                        </p:attrNameLst>
+                                      </p:cBhvr>
+                                      <p:tavLst>
+                                        <p:tav tm="0">
+                                          <p:val>
+                                            <p:strVal val="#ppt_x"/>
+                                          </p:val>
+                                        </p:tav>
+                                        <p:tav tm="100000">
+                                          <p:val>
+                                            <p:strVal val="#ppt_x"/>
+                                          </p:val>
+                                        </p:tav>
+                                      </p:tavLst>
+                                    </p:anim>
+                                    <p:anim calcmode="lin" valueType="num">
+                                      <p:cBhvr additive="base">
+                                        <p:cTn id="14" dur="500" fill="hold"/>
+                                        <p:tgtEl>
+                                          <p:spTgt spid="3">
+                                            <p:txEl>
+                                              <p:pRg st="0" end="0"/>
+                                            </p:txEl>
+                                          </p:spTgt>
+                                        </p:tgtEl>
+                                        <p:attrNameLst>
+                                          <p:attrName>ppt_y</p:attrName>
+                                        </p:attrNameLst>
+                                      </p:cBhvr>
+                                      <p:tavLst>
+                                        <p:tav tm="0">
+                                          <p:val>
+                                            <p:strVal val="1+#ppt_h/2"/>
+                                          </p:val>
+                                        </p:tav>
+                                        <p:tav tm="100000">
+                                          <p:val>
+                                            <p:strVal val="#ppt_y"/>
+                                          </p:val>
+                                        </p:tav>
+                                      </p:tavLst>
+                                    </p:anim>
+                                  </p:childTnLst>
+                                </p:cTn>
+                              </p:par>
+                            </p:childTnLst>
+                          </p:cTn>
+                        </p:par>
+                      </p:childTnLst>
+                    </p:cTn>
+                  </p:par>
+                </p:childTnLst>
+              </p:cTn>
+              <p:prevCondLst>
+                <p:cond evt="onPrev" delay="0">
+                  <p:tgtEl>
+                    <p:sldTgt/>
+                  </p:tgtEl>
+                </p:cond>
+              </p:prevCondLst>
+              <p:nextCondLst>
+                <p:cond evt="onNext" delay="0">
+                  <p:tgtEl>
+                    <p:sldTgt/>
+                  </p:tgtEl>
+                </p:cond>
+              </p:nextCondLst>
+            </p:seq>
+          </p:childTnLst>
+        </p:cTn>
+      </p:par>
+    </p:tnLst>
+    <p:bldLst>
+      <p:bldP spid="2" grpId="0"/>
+      <p:bldP spid="3" grpId="0" build="p"/>
+    </p:bldLst>
+  </p:timing>
 </p:sld>
 </file>
 
@@ -8062,6 +7435,686 @@
   <p:clrMapOvr>
     <a:masterClrMapping/>
   </p:clrMapOvr>
+  <mc:AlternateContent xmlns:mc="http://schemas.openxmlformats.org/markup-compatibility/2006" xmlns:p159="http://schemas.microsoft.com/office/powerpoint/2015/09/main">
+    <mc:Choice Requires="p159">
+      <p:transition xmlns:p14="http://schemas.microsoft.com/office/powerpoint/2010/main" spd="slow" p14:dur="2000">
+        <p159:morph option="byObject"/>
+      </p:transition>
+    </mc:Choice>
+    <mc:Fallback xmlns="">
+      <p:transition spd="slow">
+        <p:fade/>
+      </p:transition>
+    </mc:Fallback>
+  </mc:AlternateContent>
+  <p:timing>
+    <p:tnLst>
+      <p:par>
+        <p:cTn id="1" dur="indefinite" restart="never" nodeType="tmRoot">
+          <p:childTnLst>
+            <p:seq concurrent="1" nextAc="seek">
+              <p:cTn id="2" dur="indefinite" nodeType="mainSeq">
+                <p:childTnLst>
+                  <p:par>
+                    <p:cTn id="3" fill="hold">
+                      <p:stCondLst>
+                        <p:cond delay="indefinite"/>
+                      </p:stCondLst>
+                      <p:childTnLst>
+                        <p:par>
+                          <p:cTn id="4" fill="hold">
+                            <p:stCondLst>
+                              <p:cond delay="0"/>
+                            </p:stCondLst>
+                            <p:childTnLst>
+                              <p:par>
+                                <p:cTn id="5" presetID="26" presetClass="entr" presetSubtype="0" fill="hold" grpId="0" nodeType="clickEffect">
+                                  <p:stCondLst>
+                                    <p:cond delay="0"/>
+                                  </p:stCondLst>
+                                  <p:childTnLst>
+                                    <p:set>
+                                      <p:cBhvr>
+                                        <p:cTn id="6" dur="1" fill="hold">
+                                          <p:stCondLst>
+                                            <p:cond delay="0"/>
+                                          </p:stCondLst>
+                                        </p:cTn>
+                                        <p:tgtEl>
+                                          <p:spTgt spid="2"/>
+                                        </p:tgtEl>
+                                        <p:attrNameLst>
+                                          <p:attrName>style.visibility</p:attrName>
+                                        </p:attrNameLst>
+                                      </p:cBhvr>
+                                      <p:to>
+                                        <p:strVal val="visible"/>
+                                      </p:to>
+                                    </p:set>
+                                    <p:animEffect transition="in" filter="wipe(down)">
+                                      <p:cBhvr>
+                                        <p:cTn id="7" dur="580">
+                                          <p:stCondLst>
+                                            <p:cond delay="0"/>
+                                          </p:stCondLst>
+                                        </p:cTn>
+                                        <p:tgtEl>
+                                          <p:spTgt spid="2"/>
+                                        </p:tgtEl>
+                                      </p:cBhvr>
+                                    </p:animEffect>
+                                    <p:anim calcmode="lin" valueType="num">
+                                      <p:cBhvr>
+                                        <p:cTn id="8" dur="1822" tmFilter="0,0; 0.14,0.36; 0.43,0.73; 0.71,0.91; 1.0,1.0">
+                                          <p:stCondLst>
+                                            <p:cond delay="0"/>
+                                          </p:stCondLst>
+                                        </p:cTn>
+                                        <p:tgtEl>
+                                          <p:spTgt spid="2"/>
+                                        </p:tgtEl>
+                                        <p:attrNameLst>
+                                          <p:attrName>ppt_x</p:attrName>
+                                        </p:attrNameLst>
+                                      </p:cBhvr>
+                                      <p:tavLst>
+                                        <p:tav tm="0">
+                                          <p:val>
+                                            <p:strVal val="#ppt_x-0.25"/>
+                                          </p:val>
+                                        </p:tav>
+                                        <p:tav tm="100000">
+                                          <p:val>
+                                            <p:strVal val="#ppt_x"/>
+                                          </p:val>
+                                        </p:tav>
+                                      </p:tavLst>
+                                    </p:anim>
+                                    <p:anim calcmode="lin" valueType="num">
+                                      <p:cBhvr>
+                                        <p:cTn id="9" dur="664" tmFilter="0.0,0.0; 0.25,0.07; 0.50,0.2; 0.75,0.467; 1.0,1.0">
+                                          <p:stCondLst>
+                                            <p:cond delay="0"/>
+                                          </p:stCondLst>
+                                        </p:cTn>
+                                        <p:tgtEl>
+                                          <p:spTgt spid="2"/>
+                                        </p:tgtEl>
+                                        <p:attrNameLst>
+                                          <p:attrName>ppt_y</p:attrName>
+                                        </p:attrNameLst>
+                                      </p:cBhvr>
+                                      <p:tavLst>
+                                        <p:tav tm="0" fmla="#ppt_y-sin(pi*$)/3">
+                                          <p:val>
+                                            <p:fltVal val="0.5"/>
+                                          </p:val>
+                                        </p:tav>
+                                        <p:tav tm="100000">
+                                          <p:val>
+                                            <p:fltVal val="1"/>
+                                          </p:val>
+                                        </p:tav>
+                                      </p:tavLst>
+                                    </p:anim>
+                                    <p:anim calcmode="lin" valueType="num">
+                                      <p:cBhvr>
+                                        <p:cTn id="10" dur="664" tmFilter="0, 0; 0.125,0.2665; 0.25,0.4; 0.375,0.465; 0.5,0.5;  0.625,0.535; 0.75,0.6; 0.875,0.7335; 1,1">
+                                          <p:stCondLst>
+                                            <p:cond delay="664"/>
+                                          </p:stCondLst>
+                                        </p:cTn>
+                                        <p:tgtEl>
+                                          <p:spTgt spid="2"/>
+                                        </p:tgtEl>
+                                        <p:attrNameLst>
+                                          <p:attrName>ppt_y</p:attrName>
+                                        </p:attrNameLst>
+                                      </p:cBhvr>
+                                      <p:tavLst>
+                                        <p:tav tm="0" fmla="#ppt_y-sin(pi*$)/9">
+                                          <p:val>
+                                            <p:fltVal val="0"/>
+                                          </p:val>
+                                        </p:tav>
+                                        <p:tav tm="100000">
+                                          <p:val>
+                                            <p:fltVal val="1"/>
+                                          </p:val>
+                                        </p:tav>
+                                      </p:tavLst>
+                                    </p:anim>
+                                    <p:anim calcmode="lin" valueType="num">
+                                      <p:cBhvr>
+                                        <p:cTn id="11" dur="332" tmFilter="0, 0; 0.125,0.2665; 0.25,0.4; 0.375,0.465; 0.5,0.5;  0.625,0.535; 0.75,0.6; 0.875,0.7335; 1,1">
+                                          <p:stCondLst>
+                                            <p:cond delay="1324"/>
+                                          </p:stCondLst>
+                                        </p:cTn>
+                                        <p:tgtEl>
+                                          <p:spTgt spid="2"/>
+                                        </p:tgtEl>
+                                        <p:attrNameLst>
+                                          <p:attrName>ppt_y</p:attrName>
+                                        </p:attrNameLst>
+                                      </p:cBhvr>
+                                      <p:tavLst>
+                                        <p:tav tm="0" fmla="#ppt_y-sin(pi*$)/27">
+                                          <p:val>
+                                            <p:fltVal val="0"/>
+                                          </p:val>
+                                        </p:tav>
+                                        <p:tav tm="100000">
+                                          <p:val>
+                                            <p:fltVal val="1"/>
+                                          </p:val>
+                                        </p:tav>
+                                      </p:tavLst>
+                                    </p:anim>
+                                    <p:anim calcmode="lin" valueType="num">
+                                      <p:cBhvr>
+                                        <p:cTn id="12" dur="164" tmFilter="0, 0; 0.125,0.2665; 0.25,0.4; 0.375,0.465; 0.5,0.5;  0.625,0.535; 0.75,0.6; 0.875,0.7335; 1,1">
+                                          <p:stCondLst>
+                                            <p:cond delay="1656"/>
+                                          </p:stCondLst>
+                                        </p:cTn>
+                                        <p:tgtEl>
+                                          <p:spTgt spid="2"/>
+                                        </p:tgtEl>
+                                        <p:attrNameLst>
+                                          <p:attrName>ppt_y</p:attrName>
+                                        </p:attrNameLst>
+                                      </p:cBhvr>
+                                      <p:tavLst>
+                                        <p:tav tm="0" fmla="#ppt_y-sin(pi*$)/81">
+                                          <p:val>
+                                            <p:fltVal val="0"/>
+                                          </p:val>
+                                        </p:tav>
+                                        <p:tav tm="100000">
+                                          <p:val>
+                                            <p:fltVal val="1"/>
+                                          </p:val>
+                                        </p:tav>
+                                      </p:tavLst>
+                                    </p:anim>
+                                    <p:animScale>
+                                      <p:cBhvr>
+                                        <p:cTn id="13" dur="26">
+                                          <p:stCondLst>
+                                            <p:cond delay="650"/>
+                                          </p:stCondLst>
+                                        </p:cTn>
+                                        <p:tgtEl>
+                                          <p:spTgt spid="2"/>
+                                        </p:tgtEl>
+                                      </p:cBhvr>
+                                      <p:to x="100000" y="60000"/>
+                                    </p:animScale>
+                                    <p:animScale>
+                                      <p:cBhvr>
+                                        <p:cTn id="14" dur="166" decel="50000">
+                                          <p:stCondLst>
+                                            <p:cond delay="676"/>
+                                          </p:stCondLst>
+                                        </p:cTn>
+                                        <p:tgtEl>
+                                          <p:spTgt spid="2"/>
+                                        </p:tgtEl>
+                                      </p:cBhvr>
+                                      <p:to x="100000" y="100000"/>
+                                    </p:animScale>
+                                    <p:animScale>
+                                      <p:cBhvr>
+                                        <p:cTn id="15" dur="26">
+                                          <p:stCondLst>
+                                            <p:cond delay="1312"/>
+                                          </p:stCondLst>
+                                        </p:cTn>
+                                        <p:tgtEl>
+                                          <p:spTgt spid="2"/>
+                                        </p:tgtEl>
+                                      </p:cBhvr>
+                                      <p:to x="100000" y="80000"/>
+                                    </p:animScale>
+                                    <p:animScale>
+                                      <p:cBhvr>
+                                        <p:cTn id="16" dur="166" decel="50000">
+                                          <p:stCondLst>
+                                            <p:cond delay="1338"/>
+                                          </p:stCondLst>
+                                        </p:cTn>
+                                        <p:tgtEl>
+                                          <p:spTgt spid="2"/>
+                                        </p:tgtEl>
+                                      </p:cBhvr>
+                                      <p:to x="100000" y="100000"/>
+                                    </p:animScale>
+                                    <p:animScale>
+                                      <p:cBhvr>
+                                        <p:cTn id="17" dur="26">
+                                          <p:stCondLst>
+                                            <p:cond delay="1642"/>
+                                          </p:stCondLst>
+                                        </p:cTn>
+                                        <p:tgtEl>
+                                          <p:spTgt spid="2"/>
+                                        </p:tgtEl>
+                                      </p:cBhvr>
+                                      <p:to x="100000" y="90000"/>
+                                    </p:animScale>
+                                    <p:animScale>
+                                      <p:cBhvr>
+                                        <p:cTn id="18" dur="166" decel="50000">
+                                          <p:stCondLst>
+                                            <p:cond delay="1668"/>
+                                          </p:stCondLst>
+                                        </p:cTn>
+                                        <p:tgtEl>
+                                          <p:spTgt spid="2"/>
+                                        </p:tgtEl>
+                                      </p:cBhvr>
+                                      <p:to x="100000" y="100000"/>
+                                    </p:animScale>
+                                    <p:animScale>
+                                      <p:cBhvr>
+                                        <p:cTn id="19" dur="26">
+                                          <p:stCondLst>
+                                            <p:cond delay="1808"/>
+                                          </p:stCondLst>
+                                        </p:cTn>
+                                        <p:tgtEl>
+                                          <p:spTgt spid="2"/>
+                                        </p:tgtEl>
+                                      </p:cBhvr>
+                                      <p:to x="100000" y="95000"/>
+                                    </p:animScale>
+                                    <p:animScale>
+                                      <p:cBhvr>
+                                        <p:cTn id="20" dur="166" decel="50000">
+                                          <p:stCondLst>
+                                            <p:cond delay="1834"/>
+                                          </p:stCondLst>
+                                        </p:cTn>
+                                        <p:tgtEl>
+                                          <p:spTgt spid="2"/>
+                                        </p:tgtEl>
+                                      </p:cBhvr>
+                                      <p:to x="100000" y="100000"/>
+                                    </p:animScale>
+                                  </p:childTnLst>
+                                </p:cTn>
+                              </p:par>
+                              <p:par>
+                                <p:cTn id="21" presetID="26" presetClass="entr" presetSubtype="0" fill="hold" grpId="0" nodeType="withEffect">
+                                  <p:stCondLst>
+                                    <p:cond delay="0"/>
+                                  </p:stCondLst>
+                                  <p:childTnLst>
+                                    <p:set>
+                                      <p:cBhvr>
+                                        <p:cTn id="22" dur="1" fill="hold">
+                                          <p:stCondLst>
+                                            <p:cond delay="0"/>
+                                          </p:stCondLst>
+                                        </p:cTn>
+                                        <p:tgtEl>
+                                          <p:spTgt spid="3">
+                                            <p:txEl>
+                                              <p:pRg st="0" end="0"/>
+                                            </p:txEl>
+                                          </p:spTgt>
+                                        </p:tgtEl>
+                                        <p:attrNameLst>
+                                          <p:attrName>style.visibility</p:attrName>
+                                        </p:attrNameLst>
+                                      </p:cBhvr>
+                                      <p:to>
+                                        <p:strVal val="visible"/>
+                                      </p:to>
+                                    </p:set>
+                                    <p:animEffect transition="in" filter="wipe(down)">
+                                      <p:cBhvr>
+                                        <p:cTn id="23" dur="580">
+                                          <p:stCondLst>
+                                            <p:cond delay="0"/>
+                                          </p:stCondLst>
+                                        </p:cTn>
+                                        <p:tgtEl>
+                                          <p:spTgt spid="3">
+                                            <p:txEl>
+                                              <p:pRg st="0" end="0"/>
+                                            </p:txEl>
+                                          </p:spTgt>
+                                        </p:tgtEl>
+                                      </p:cBhvr>
+                                    </p:animEffect>
+                                    <p:anim calcmode="lin" valueType="num">
+                                      <p:cBhvr>
+                                        <p:cTn id="24" dur="1822" tmFilter="0,0; 0.14,0.36; 0.43,0.73; 0.71,0.91; 1.0,1.0">
+                                          <p:stCondLst>
+                                            <p:cond delay="0"/>
+                                          </p:stCondLst>
+                                        </p:cTn>
+                                        <p:tgtEl>
+                                          <p:spTgt spid="3">
+                                            <p:txEl>
+                                              <p:pRg st="0" end="0"/>
+                                            </p:txEl>
+                                          </p:spTgt>
+                                        </p:tgtEl>
+                                        <p:attrNameLst>
+                                          <p:attrName>ppt_x</p:attrName>
+                                        </p:attrNameLst>
+                                      </p:cBhvr>
+                                      <p:tavLst>
+                                        <p:tav tm="0">
+                                          <p:val>
+                                            <p:strVal val="#ppt_x-0.25"/>
+                                          </p:val>
+                                        </p:tav>
+                                        <p:tav tm="100000">
+                                          <p:val>
+                                            <p:strVal val="#ppt_x"/>
+                                          </p:val>
+                                        </p:tav>
+                                      </p:tavLst>
+                                    </p:anim>
+                                    <p:anim calcmode="lin" valueType="num">
+                                      <p:cBhvr>
+                                        <p:cTn id="25" dur="664" tmFilter="0.0,0.0; 0.25,0.07; 0.50,0.2; 0.75,0.467; 1.0,1.0">
+                                          <p:stCondLst>
+                                            <p:cond delay="0"/>
+                                          </p:stCondLst>
+                                        </p:cTn>
+                                        <p:tgtEl>
+                                          <p:spTgt spid="3">
+                                            <p:txEl>
+                                              <p:pRg st="0" end="0"/>
+                                            </p:txEl>
+                                          </p:spTgt>
+                                        </p:tgtEl>
+                                        <p:attrNameLst>
+                                          <p:attrName>ppt_y</p:attrName>
+                                        </p:attrNameLst>
+                                      </p:cBhvr>
+                                      <p:tavLst>
+                                        <p:tav tm="0" fmla="#ppt_y-sin(pi*$)/3">
+                                          <p:val>
+                                            <p:fltVal val="0.5"/>
+                                          </p:val>
+                                        </p:tav>
+                                        <p:tav tm="100000">
+                                          <p:val>
+                                            <p:fltVal val="1"/>
+                                          </p:val>
+                                        </p:tav>
+                                      </p:tavLst>
+                                    </p:anim>
+                                    <p:anim calcmode="lin" valueType="num">
+                                      <p:cBhvr>
+                                        <p:cTn id="26" dur="664" tmFilter="0, 0; 0.125,0.2665; 0.25,0.4; 0.375,0.465; 0.5,0.5;  0.625,0.535; 0.75,0.6; 0.875,0.7335; 1,1">
+                                          <p:stCondLst>
+                                            <p:cond delay="664"/>
+                                          </p:stCondLst>
+                                        </p:cTn>
+                                        <p:tgtEl>
+                                          <p:spTgt spid="3">
+                                            <p:txEl>
+                                              <p:pRg st="0" end="0"/>
+                                            </p:txEl>
+                                          </p:spTgt>
+                                        </p:tgtEl>
+                                        <p:attrNameLst>
+                                          <p:attrName>ppt_y</p:attrName>
+                                        </p:attrNameLst>
+                                      </p:cBhvr>
+                                      <p:tavLst>
+                                        <p:tav tm="0" fmla="#ppt_y-sin(pi*$)/9">
+                                          <p:val>
+                                            <p:fltVal val="0"/>
+                                          </p:val>
+                                        </p:tav>
+                                        <p:tav tm="100000">
+                                          <p:val>
+                                            <p:fltVal val="1"/>
+                                          </p:val>
+                                        </p:tav>
+                                      </p:tavLst>
+                                    </p:anim>
+                                    <p:anim calcmode="lin" valueType="num">
+                                      <p:cBhvr>
+                                        <p:cTn id="27" dur="332" tmFilter="0, 0; 0.125,0.2665; 0.25,0.4; 0.375,0.465; 0.5,0.5;  0.625,0.535; 0.75,0.6; 0.875,0.7335; 1,1">
+                                          <p:stCondLst>
+                                            <p:cond delay="1324"/>
+                                          </p:stCondLst>
+                                        </p:cTn>
+                                        <p:tgtEl>
+                                          <p:spTgt spid="3">
+                                            <p:txEl>
+                                              <p:pRg st="0" end="0"/>
+                                            </p:txEl>
+                                          </p:spTgt>
+                                        </p:tgtEl>
+                                        <p:attrNameLst>
+                                          <p:attrName>ppt_y</p:attrName>
+                                        </p:attrNameLst>
+                                      </p:cBhvr>
+                                      <p:tavLst>
+                                        <p:tav tm="0" fmla="#ppt_y-sin(pi*$)/27">
+                                          <p:val>
+                                            <p:fltVal val="0"/>
+                                          </p:val>
+                                        </p:tav>
+                                        <p:tav tm="100000">
+                                          <p:val>
+                                            <p:fltVal val="1"/>
+                                          </p:val>
+                                        </p:tav>
+                                      </p:tavLst>
+                                    </p:anim>
+                                    <p:anim calcmode="lin" valueType="num">
+                                      <p:cBhvr>
+                                        <p:cTn id="28" dur="164" tmFilter="0, 0; 0.125,0.2665; 0.25,0.4; 0.375,0.465; 0.5,0.5;  0.625,0.535; 0.75,0.6; 0.875,0.7335; 1,1">
+                                          <p:stCondLst>
+                                            <p:cond delay="1656"/>
+                                          </p:stCondLst>
+                                        </p:cTn>
+                                        <p:tgtEl>
+                                          <p:spTgt spid="3">
+                                            <p:txEl>
+                                              <p:pRg st="0" end="0"/>
+                                            </p:txEl>
+                                          </p:spTgt>
+                                        </p:tgtEl>
+                                        <p:attrNameLst>
+                                          <p:attrName>ppt_y</p:attrName>
+                                        </p:attrNameLst>
+                                      </p:cBhvr>
+                                      <p:tavLst>
+                                        <p:tav tm="0" fmla="#ppt_y-sin(pi*$)/81">
+                                          <p:val>
+                                            <p:fltVal val="0"/>
+                                          </p:val>
+                                        </p:tav>
+                                        <p:tav tm="100000">
+                                          <p:val>
+                                            <p:fltVal val="1"/>
+                                          </p:val>
+                                        </p:tav>
+                                      </p:tavLst>
+                                    </p:anim>
+                                    <p:animScale>
+                                      <p:cBhvr>
+                                        <p:cTn id="29" dur="26">
+                                          <p:stCondLst>
+                                            <p:cond delay="650"/>
+                                          </p:stCondLst>
+                                        </p:cTn>
+                                        <p:tgtEl>
+                                          <p:spTgt spid="3">
+                                            <p:txEl>
+                                              <p:pRg st="0" end="0"/>
+                                            </p:txEl>
+                                          </p:spTgt>
+                                        </p:tgtEl>
+                                      </p:cBhvr>
+                                      <p:to x="100000" y="60000"/>
+                                    </p:animScale>
+                                    <p:animScale>
+                                      <p:cBhvr>
+                                        <p:cTn id="30" dur="166" decel="50000">
+                                          <p:stCondLst>
+                                            <p:cond delay="676"/>
+                                          </p:stCondLst>
+                                        </p:cTn>
+                                        <p:tgtEl>
+                                          <p:spTgt spid="3">
+                                            <p:txEl>
+                                              <p:pRg st="0" end="0"/>
+                                            </p:txEl>
+                                          </p:spTgt>
+                                        </p:tgtEl>
+                                      </p:cBhvr>
+                                      <p:to x="100000" y="100000"/>
+                                    </p:animScale>
+                                    <p:animScale>
+                                      <p:cBhvr>
+                                        <p:cTn id="31" dur="26">
+                                          <p:stCondLst>
+                                            <p:cond delay="1312"/>
+                                          </p:stCondLst>
+                                        </p:cTn>
+                                        <p:tgtEl>
+                                          <p:spTgt spid="3">
+                                            <p:txEl>
+                                              <p:pRg st="0" end="0"/>
+                                            </p:txEl>
+                                          </p:spTgt>
+                                        </p:tgtEl>
+                                      </p:cBhvr>
+                                      <p:to x="100000" y="80000"/>
+                                    </p:animScale>
+                                    <p:animScale>
+                                      <p:cBhvr>
+                                        <p:cTn id="32" dur="166" decel="50000">
+                                          <p:stCondLst>
+                                            <p:cond delay="1338"/>
+                                          </p:stCondLst>
+                                        </p:cTn>
+                                        <p:tgtEl>
+                                          <p:spTgt spid="3">
+                                            <p:txEl>
+                                              <p:pRg st="0" end="0"/>
+                                            </p:txEl>
+                                          </p:spTgt>
+                                        </p:tgtEl>
+                                      </p:cBhvr>
+                                      <p:to x="100000" y="100000"/>
+                                    </p:animScale>
+                                    <p:animScale>
+                                      <p:cBhvr>
+                                        <p:cTn id="33" dur="26">
+                                          <p:stCondLst>
+                                            <p:cond delay="1642"/>
+                                          </p:stCondLst>
+                                        </p:cTn>
+                                        <p:tgtEl>
+                                          <p:spTgt spid="3">
+                                            <p:txEl>
+                                              <p:pRg st="0" end="0"/>
+                                            </p:txEl>
+                                          </p:spTgt>
+                                        </p:tgtEl>
+                                      </p:cBhvr>
+                                      <p:to x="100000" y="90000"/>
+                                    </p:animScale>
+                                    <p:animScale>
+                                      <p:cBhvr>
+                                        <p:cTn id="34" dur="166" decel="50000">
+                                          <p:stCondLst>
+                                            <p:cond delay="1668"/>
+                                          </p:stCondLst>
+                                        </p:cTn>
+                                        <p:tgtEl>
+                                          <p:spTgt spid="3">
+                                            <p:txEl>
+                                              <p:pRg st="0" end="0"/>
+                                            </p:txEl>
+                                          </p:spTgt>
+                                        </p:tgtEl>
+                                      </p:cBhvr>
+                                      <p:to x="100000" y="100000"/>
+                                    </p:animScale>
+                                    <p:animScale>
+                                      <p:cBhvr>
+                                        <p:cTn id="35" dur="26">
+                                          <p:stCondLst>
+                                            <p:cond delay="1808"/>
+                                          </p:stCondLst>
+                                        </p:cTn>
+                                        <p:tgtEl>
+                                          <p:spTgt spid="3">
+                                            <p:txEl>
+                                              <p:pRg st="0" end="0"/>
+                                            </p:txEl>
+                                          </p:spTgt>
+                                        </p:tgtEl>
+                                      </p:cBhvr>
+                                      <p:to x="100000" y="95000"/>
+                                    </p:animScale>
+                                    <p:animScale>
+                                      <p:cBhvr>
+                                        <p:cTn id="36" dur="166" decel="50000">
+                                          <p:stCondLst>
+                                            <p:cond delay="1834"/>
+                                          </p:stCondLst>
+                                        </p:cTn>
+                                        <p:tgtEl>
+                                          <p:spTgt spid="3">
+                                            <p:txEl>
+                                              <p:pRg st="0" end="0"/>
+                                            </p:txEl>
+                                          </p:spTgt>
+                                        </p:tgtEl>
+                                      </p:cBhvr>
+                                      <p:to x="100000" y="100000"/>
+                                    </p:animScale>
+                                  </p:childTnLst>
+                                </p:cTn>
+                              </p:par>
+                            </p:childTnLst>
+                          </p:cTn>
+                        </p:par>
+                      </p:childTnLst>
+                    </p:cTn>
+                  </p:par>
+                </p:childTnLst>
+              </p:cTn>
+              <p:prevCondLst>
+                <p:cond evt="onPrev" delay="0">
+                  <p:tgtEl>
+                    <p:sldTgt/>
+                  </p:tgtEl>
+                </p:cond>
+              </p:prevCondLst>
+              <p:nextCondLst>
+                <p:cond evt="onNext" delay="0">
+                  <p:tgtEl>
+                    <p:sldTgt/>
+                  </p:tgtEl>
+                </p:cond>
+              </p:nextCondLst>
+            </p:seq>
+          </p:childTnLst>
+        </p:cTn>
+      </p:par>
+    </p:tnLst>
+    <p:bldLst>
+      <p:bldP spid="2" grpId="0"/>
+      <p:bldP spid="3" grpId="0" build="p"/>
+    </p:bldLst>
+  </p:timing>
 </p:sld>
 </file>
 
@@ -8238,37 +8291,6 @@
           </a:p>
         </p:txBody>
       </p:sp>
-      <p:graphicFrame>
-        <p:nvGraphicFramePr>
-          <p:cNvPr id="6" name="Tartalom helye 5" descr="Értékesítési diagram">
-            <a:extLst>
-              <a:ext uri="{FF2B5EF4-FFF2-40B4-BE49-F238E27FC236}">
-                <a16:creationId xmlns:a16="http://schemas.microsoft.com/office/drawing/2014/main" id="{DF8EEC1C-C378-42F4-860F-7B7D01A9D0DF}"/>
-              </a:ext>
-            </a:extLst>
-          </p:cNvPr>
-          <p:cNvGraphicFramePr>
-            <a:graphicFrameLocks noGrp="1"/>
-          </p:cNvGraphicFramePr>
-          <p:nvPr>
-            <p:ph idx="1"/>
-            <p:extLst>
-              <p:ext uri="{D42A27DB-BD31-4B8C-83A1-F6EECF244321}">
-                <p14:modId xmlns:p14="http://schemas.microsoft.com/office/powerpoint/2010/main" val="4080569166"/>
-              </p:ext>
-            </p:extLst>
-          </p:nvPr>
-        </p:nvGraphicFramePr>
-        <p:xfrm>
-          <a:off x="1650124" y="842168"/>
-          <a:ext cx="6187966" cy="4852495"/>
-        </p:xfrm>
-        <a:graphic>
-          <a:graphicData uri="http://schemas.openxmlformats.org/drawingml/2006/chart">
-            <c:chart xmlns:c="http://schemas.openxmlformats.org/drawingml/2006/chart" xmlns:r="http://schemas.openxmlformats.org/officeDocument/2006/relationships" r:id="rId4"/>
-          </a:graphicData>
-        </a:graphic>
-      </p:graphicFrame>
       <p:sp>
         <p:nvSpPr>
           <p:cNvPr id="7" name="Tartalom helye 2">
@@ -8285,8 +8307,8 @@
         </p:nvSpPr>
         <p:spPr>
           <a:xfrm>
-            <a:off x="7838090" y="1821180"/>
-            <a:ext cx="4114800" cy="3215640"/>
+            <a:off x="296040" y="1360156"/>
+            <a:ext cx="9755789" cy="1525522"/>
           </a:xfrm>
           <a:prstGeom prst="rect">
             <a:avLst/>
@@ -8294,7 +8316,7 @@
         </p:spPr>
         <p:txBody>
           <a:bodyPr vert="horz" lIns="91440" tIns="45720" rIns="91440" bIns="45720" rtlCol="0">
-            <a:normAutofit lnSpcReduction="10000"/>
+            <a:noAutofit/>
           </a:bodyPr>
           <a:lstStyle>
             <a:lvl1pPr marL="228600" indent="-228600" algn="l" defTabSz="914400" rtl="0" eaLnBrk="1" latinLnBrk="0" hangingPunct="1">
@@ -8462,34 +8484,423 @@
           </a:lstStyle>
           <a:p>
             <a:r>
-              <a:rPr lang="hu-HU" dirty="0"/>
+              <a:rPr lang="hu-HU" sz="3600" dirty="0"/>
               <a:t>Kriston-Széles Flórián: Csapatfőnök, témaötlet, adatbázis, </a:t>
             </a:r>
             <a:r>
-              <a:rPr lang="hu-HU" dirty="0" err="1"/>
+              <a:rPr lang="hu-HU" sz="3600" dirty="0" err="1"/>
               <a:t>Typescript</a:t>
             </a:r>
             <a:r>
-              <a:rPr lang="hu-HU" dirty="0"/>
-              <a:t> kódolás</a:t>
-            </a:r>
-          </a:p>
-          <a:p>
-            <a:r>
-              <a:rPr lang="hu-HU" dirty="0"/>
-              <a:t>Krizsai Tamás: API létrehozása és kezelésének automatizálása, lelki támogatás, </a:t>
-            </a:r>
-          </a:p>
-          <a:p>
-            <a:r>
-              <a:rPr lang="hu-HU" dirty="0"/>
+              <a:rPr lang="hu-HU" sz="3600" dirty="0"/>
+              <a:t> kódolás, dokumentáció megformázása</a:t>
+            </a:r>
+          </a:p>
+        </p:txBody>
+      </p:sp>
+      <p:sp>
+        <p:nvSpPr>
+          <p:cNvPr id="8" name="Tartalom helye 2">
+            <a:extLst>
+              <a:ext uri="{FF2B5EF4-FFF2-40B4-BE49-F238E27FC236}">
+                <a16:creationId xmlns:a16="http://schemas.microsoft.com/office/drawing/2014/main" id="{00234F48-CB65-456B-8EED-5BB5FE08B2E1}"/>
+              </a:ext>
+            </a:extLst>
+          </p:cNvPr>
+          <p:cNvSpPr txBox="1">
+            <a:spLocks/>
+          </p:cNvSpPr>
+          <p:nvPr/>
+        </p:nvSpPr>
+        <p:spPr>
+          <a:xfrm>
+            <a:off x="296039" y="2885678"/>
+            <a:ext cx="9755789" cy="1525522"/>
+          </a:xfrm>
+          <a:prstGeom prst="rect">
+            <a:avLst/>
+          </a:prstGeom>
+        </p:spPr>
+        <p:txBody>
+          <a:bodyPr vert="horz" lIns="91440" tIns="45720" rIns="91440" bIns="45720" rtlCol="0">
+            <a:noAutofit/>
+          </a:bodyPr>
+          <a:lstStyle>
+            <a:lvl1pPr marL="228600" indent="-228600" algn="l" defTabSz="914400" rtl="0" eaLnBrk="1" latinLnBrk="0" hangingPunct="1">
+              <a:lnSpc>
+                <a:spcPct val="90000"/>
+              </a:lnSpc>
+              <a:spcBef>
+                <a:spcPts val="1000"/>
+              </a:spcBef>
+              <a:buFont typeface="Arial" panose="020B0604020202020204" pitchFamily="34" charset="0"/>
+              <a:buChar char="•"/>
+              <a:defRPr sz="2200" kern="1200">
+                <a:solidFill>
+                  <a:schemeClr val="tx1"/>
+                </a:solidFill>
+                <a:latin typeface="+mn-lt"/>
+                <a:ea typeface="+mn-ea"/>
+                <a:cs typeface="+mn-cs"/>
+              </a:defRPr>
+            </a:lvl1pPr>
+            <a:lvl2pPr marL="685800" indent="-228600" algn="l" defTabSz="914400" rtl="0" eaLnBrk="1" latinLnBrk="0" hangingPunct="1">
+              <a:lnSpc>
+                <a:spcPct val="90000"/>
+              </a:lnSpc>
+              <a:spcBef>
+                <a:spcPts val="500"/>
+              </a:spcBef>
+              <a:buFont typeface="Arial" panose="020B0604020202020204" pitchFamily="34" charset="0"/>
+              <a:buChar char="•"/>
+              <a:defRPr sz="2000" kern="1200">
+                <a:solidFill>
+                  <a:schemeClr val="tx1"/>
+                </a:solidFill>
+                <a:latin typeface="+mn-lt"/>
+                <a:ea typeface="+mn-ea"/>
+                <a:cs typeface="+mn-cs"/>
+              </a:defRPr>
+            </a:lvl2pPr>
+            <a:lvl3pPr marL="1143000" indent="-228600" algn="l" defTabSz="914400" rtl="0" eaLnBrk="1" latinLnBrk="0" hangingPunct="1">
+              <a:lnSpc>
+                <a:spcPct val="90000"/>
+              </a:lnSpc>
+              <a:spcBef>
+                <a:spcPts val="500"/>
+              </a:spcBef>
+              <a:buFont typeface="Arial" panose="020B0604020202020204" pitchFamily="34" charset="0"/>
+              <a:buChar char="•"/>
+              <a:defRPr sz="1800" kern="1200">
+                <a:solidFill>
+                  <a:schemeClr val="tx1"/>
+                </a:solidFill>
+                <a:latin typeface="+mn-lt"/>
+                <a:ea typeface="+mn-ea"/>
+                <a:cs typeface="+mn-cs"/>
+              </a:defRPr>
+            </a:lvl3pPr>
+            <a:lvl4pPr marL="1600200" indent="-228600" algn="l" defTabSz="914400" rtl="0" eaLnBrk="1" latinLnBrk="0" hangingPunct="1">
+              <a:lnSpc>
+                <a:spcPct val="90000"/>
+              </a:lnSpc>
+              <a:spcBef>
+                <a:spcPts val="500"/>
+              </a:spcBef>
+              <a:buFont typeface="Arial" panose="020B0604020202020204" pitchFamily="34" charset="0"/>
+              <a:buChar char="•"/>
+              <a:defRPr sz="1600" kern="1200">
+                <a:solidFill>
+                  <a:schemeClr val="tx1"/>
+                </a:solidFill>
+                <a:latin typeface="+mn-lt"/>
+                <a:ea typeface="+mn-ea"/>
+                <a:cs typeface="+mn-cs"/>
+              </a:defRPr>
+            </a:lvl4pPr>
+            <a:lvl5pPr marL="2057400" indent="-228600" algn="l" defTabSz="914400" rtl="0" eaLnBrk="1" latinLnBrk="0" hangingPunct="1">
+              <a:lnSpc>
+                <a:spcPct val="90000"/>
+              </a:lnSpc>
+              <a:spcBef>
+                <a:spcPts val="500"/>
+              </a:spcBef>
+              <a:buFont typeface="Arial" panose="020B0604020202020204" pitchFamily="34" charset="0"/>
+              <a:buChar char="•"/>
+              <a:defRPr sz="1600" kern="1200">
+                <a:solidFill>
+                  <a:schemeClr val="tx1"/>
+                </a:solidFill>
+                <a:latin typeface="+mn-lt"/>
+                <a:ea typeface="+mn-ea"/>
+                <a:cs typeface="+mn-cs"/>
+              </a:defRPr>
+            </a:lvl5pPr>
+            <a:lvl6pPr marL="2514600" indent="-228600" algn="l" defTabSz="914400" rtl="0" eaLnBrk="1" latinLnBrk="0" hangingPunct="1">
+              <a:lnSpc>
+                <a:spcPct val="90000"/>
+              </a:lnSpc>
+              <a:spcBef>
+                <a:spcPts val="500"/>
+              </a:spcBef>
+              <a:buFont typeface="Arial" panose="020B0604020202020204" pitchFamily="34" charset="0"/>
+              <a:buChar char="•"/>
+              <a:defRPr sz="1600" kern="1200">
+                <a:solidFill>
+                  <a:schemeClr val="tx1"/>
+                </a:solidFill>
+                <a:latin typeface="+mn-lt"/>
+                <a:ea typeface="+mn-ea"/>
+                <a:cs typeface="+mn-cs"/>
+              </a:defRPr>
+            </a:lvl6pPr>
+            <a:lvl7pPr marL="2971800" indent="-228600" algn="l" defTabSz="914400" rtl="0" eaLnBrk="1" latinLnBrk="0" hangingPunct="1">
+              <a:lnSpc>
+                <a:spcPct val="90000"/>
+              </a:lnSpc>
+              <a:spcBef>
+                <a:spcPts val="500"/>
+              </a:spcBef>
+              <a:buFont typeface="Arial" panose="020B0604020202020204" pitchFamily="34" charset="0"/>
+              <a:buChar char="•"/>
+              <a:defRPr sz="1600" kern="1200">
+                <a:solidFill>
+                  <a:schemeClr val="tx1"/>
+                </a:solidFill>
+                <a:latin typeface="+mn-lt"/>
+                <a:ea typeface="+mn-ea"/>
+                <a:cs typeface="+mn-cs"/>
+              </a:defRPr>
+            </a:lvl7pPr>
+            <a:lvl8pPr marL="3429000" indent="-228600" algn="l" defTabSz="914400" rtl="0" eaLnBrk="1" latinLnBrk="0" hangingPunct="1">
+              <a:lnSpc>
+                <a:spcPct val="90000"/>
+              </a:lnSpc>
+              <a:spcBef>
+                <a:spcPts val="500"/>
+              </a:spcBef>
+              <a:buFont typeface="Arial" panose="020B0604020202020204" pitchFamily="34" charset="0"/>
+              <a:buChar char="•"/>
+              <a:defRPr sz="1600" kern="1200">
+                <a:solidFill>
+                  <a:schemeClr val="tx1"/>
+                </a:solidFill>
+                <a:latin typeface="+mn-lt"/>
+                <a:ea typeface="+mn-ea"/>
+                <a:cs typeface="+mn-cs"/>
+              </a:defRPr>
+            </a:lvl8pPr>
+            <a:lvl9pPr marL="3886200" indent="-228600" algn="l" defTabSz="914400" rtl="0" eaLnBrk="1" latinLnBrk="0" hangingPunct="1">
+              <a:lnSpc>
+                <a:spcPct val="90000"/>
+              </a:lnSpc>
+              <a:spcBef>
+                <a:spcPts val="500"/>
+              </a:spcBef>
+              <a:buFont typeface="Arial" panose="020B0604020202020204" pitchFamily="34" charset="0"/>
+              <a:buChar char="•"/>
+              <a:defRPr sz="1600" kern="1200">
+                <a:solidFill>
+                  <a:schemeClr val="tx1"/>
+                </a:solidFill>
+                <a:latin typeface="+mn-lt"/>
+                <a:ea typeface="+mn-ea"/>
+                <a:cs typeface="+mn-cs"/>
+              </a:defRPr>
+            </a:lvl9pPr>
+          </a:lstStyle>
+          <a:p>
+            <a:r>
+              <a:rPr lang="hu-HU" sz="3600" dirty="0"/>
+              <a:t>Krizsai Tamás: API létrehozása és kezelésének automatizálása, lelki támogatás, backend dokumentáció írása</a:t>
+            </a:r>
+          </a:p>
+        </p:txBody>
+      </p:sp>
+      <p:sp>
+        <p:nvSpPr>
+          <p:cNvPr id="9" name="Tartalom helye 2">
+            <a:extLst>
+              <a:ext uri="{FF2B5EF4-FFF2-40B4-BE49-F238E27FC236}">
+                <a16:creationId xmlns:a16="http://schemas.microsoft.com/office/drawing/2014/main" id="{50128663-E17B-4179-885E-F1487C1711AD}"/>
+              </a:ext>
+            </a:extLst>
+          </p:cNvPr>
+          <p:cNvSpPr txBox="1">
+            <a:spLocks/>
+          </p:cNvSpPr>
+          <p:nvPr/>
+        </p:nvSpPr>
+        <p:spPr>
+          <a:xfrm>
+            <a:off x="296038" y="4448035"/>
+            <a:ext cx="9755789" cy="1737262"/>
+          </a:xfrm>
+          <a:prstGeom prst="rect">
+            <a:avLst/>
+          </a:prstGeom>
+        </p:spPr>
+        <p:txBody>
+          <a:bodyPr vert="horz" lIns="91440" tIns="45720" rIns="91440" bIns="45720" rtlCol="0">
+            <a:noAutofit/>
+          </a:bodyPr>
+          <a:lstStyle>
+            <a:lvl1pPr marL="228600" indent="-228600" algn="l" defTabSz="914400" rtl="0" eaLnBrk="1" latinLnBrk="0" hangingPunct="1">
+              <a:lnSpc>
+                <a:spcPct val="90000"/>
+              </a:lnSpc>
+              <a:spcBef>
+                <a:spcPts val="1000"/>
+              </a:spcBef>
+              <a:buFont typeface="Arial" panose="020B0604020202020204" pitchFamily="34" charset="0"/>
+              <a:buChar char="•"/>
+              <a:defRPr sz="2200" kern="1200">
+                <a:solidFill>
+                  <a:schemeClr val="tx1"/>
+                </a:solidFill>
+                <a:latin typeface="+mn-lt"/>
+                <a:ea typeface="+mn-ea"/>
+                <a:cs typeface="+mn-cs"/>
+              </a:defRPr>
+            </a:lvl1pPr>
+            <a:lvl2pPr marL="685800" indent="-228600" algn="l" defTabSz="914400" rtl="0" eaLnBrk="1" latinLnBrk="0" hangingPunct="1">
+              <a:lnSpc>
+                <a:spcPct val="90000"/>
+              </a:lnSpc>
+              <a:spcBef>
+                <a:spcPts val="500"/>
+              </a:spcBef>
+              <a:buFont typeface="Arial" panose="020B0604020202020204" pitchFamily="34" charset="0"/>
+              <a:buChar char="•"/>
+              <a:defRPr sz="2000" kern="1200">
+                <a:solidFill>
+                  <a:schemeClr val="tx1"/>
+                </a:solidFill>
+                <a:latin typeface="+mn-lt"/>
+                <a:ea typeface="+mn-ea"/>
+                <a:cs typeface="+mn-cs"/>
+              </a:defRPr>
+            </a:lvl2pPr>
+            <a:lvl3pPr marL="1143000" indent="-228600" algn="l" defTabSz="914400" rtl="0" eaLnBrk="1" latinLnBrk="0" hangingPunct="1">
+              <a:lnSpc>
+                <a:spcPct val="90000"/>
+              </a:lnSpc>
+              <a:spcBef>
+                <a:spcPts val="500"/>
+              </a:spcBef>
+              <a:buFont typeface="Arial" panose="020B0604020202020204" pitchFamily="34" charset="0"/>
+              <a:buChar char="•"/>
+              <a:defRPr sz="1800" kern="1200">
+                <a:solidFill>
+                  <a:schemeClr val="tx1"/>
+                </a:solidFill>
+                <a:latin typeface="+mn-lt"/>
+                <a:ea typeface="+mn-ea"/>
+                <a:cs typeface="+mn-cs"/>
+              </a:defRPr>
+            </a:lvl3pPr>
+            <a:lvl4pPr marL="1600200" indent="-228600" algn="l" defTabSz="914400" rtl="0" eaLnBrk="1" latinLnBrk="0" hangingPunct="1">
+              <a:lnSpc>
+                <a:spcPct val="90000"/>
+              </a:lnSpc>
+              <a:spcBef>
+                <a:spcPts val="500"/>
+              </a:spcBef>
+              <a:buFont typeface="Arial" panose="020B0604020202020204" pitchFamily="34" charset="0"/>
+              <a:buChar char="•"/>
+              <a:defRPr sz="1600" kern="1200">
+                <a:solidFill>
+                  <a:schemeClr val="tx1"/>
+                </a:solidFill>
+                <a:latin typeface="+mn-lt"/>
+                <a:ea typeface="+mn-ea"/>
+                <a:cs typeface="+mn-cs"/>
+              </a:defRPr>
+            </a:lvl4pPr>
+            <a:lvl5pPr marL="2057400" indent="-228600" algn="l" defTabSz="914400" rtl="0" eaLnBrk="1" latinLnBrk="0" hangingPunct="1">
+              <a:lnSpc>
+                <a:spcPct val="90000"/>
+              </a:lnSpc>
+              <a:spcBef>
+                <a:spcPts val="500"/>
+              </a:spcBef>
+              <a:buFont typeface="Arial" panose="020B0604020202020204" pitchFamily="34" charset="0"/>
+              <a:buChar char="•"/>
+              <a:defRPr sz="1600" kern="1200">
+                <a:solidFill>
+                  <a:schemeClr val="tx1"/>
+                </a:solidFill>
+                <a:latin typeface="+mn-lt"/>
+                <a:ea typeface="+mn-ea"/>
+                <a:cs typeface="+mn-cs"/>
+              </a:defRPr>
+            </a:lvl5pPr>
+            <a:lvl6pPr marL="2514600" indent="-228600" algn="l" defTabSz="914400" rtl="0" eaLnBrk="1" latinLnBrk="0" hangingPunct="1">
+              <a:lnSpc>
+                <a:spcPct val="90000"/>
+              </a:lnSpc>
+              <a:spcBef>
+                <a:spcPts val="500"/>
+              </a:spcBef>
+              <a:buFont typeface="Arial" panose="020B0604020202020204" pitchFamily="34" charset="0"/>
+              <a:buChar char="•"/>
+              <a:defRPr sz="1600" kern="1200">
+                <a:solidFill>
+                  <a:schemeClr val="tx1"/>
+                </a:solidFill>
+                <a:latin typeface="+mn-lt"/>
+                <a:ea typeface="+mn-ea"/>
+                <a:cs typeface="+mn-cs"/>
+              </a:defRPr>
+            </a:lvl6pPr>
+            <a:lvl7pPr marL="2971800" indent="-228600" algn="l" defTabSz="914400" rtl="0" eaLnBrk="1" latinLnBrk="0" hangingPunct="1">
+              <a:lnSpc>
+                <a:spcPct val="90000"/>
+              </a:lnSpc>
+              <a:spcBef>
+                <a:spcPts val="500"/>
+              </a:spcBef>
+              <a:buFont typeface="Arial" panose="020B0604020202020204" pitchFamily="34" charset="0"/>
+              <a:buChar char="•"/>
+              <a:defRPr sz="1600" kern="1200">
+                <a:solidFill>
+                  <a:schemeClr val="tx1"/>
+                </a:solidFill>
+                <a:latin typeface="+mn-lt"/>
+                <a:ea typeface="+mn-ea"/>
+                <a:cs typeface="+mn-cs"/>
+              </a:defRPr>
+            </a:lvl7pPr>
+            <a:lvl8pPr marL="3429000" indent="-228600" algn="l" defTabSz="914400" rtl="0" eaLnBrk="1" latinLnBrk="0" hangingPunct="1">
+              <a:lnSpc>
+                <a:spcPct val="90000"/>
+              </a:lnSpc>
+              <a:spcBef>
+                <a:spcPts val="500"/>
+              </a:spcBef>
+              <a:buFont typeface="Arial" panose="020B0604020202020204" pitchFamily="34" charset="0"/>
+              <a:buChar char="•"/>
+              <a:defRPr sz="1600" kern="1200">
+                <a:solidFill>
+                  <a:schemeClr val="tx1"/>
+                </a:solidFill>
+                <a:latin typeface="+mn-lt"/>
+                <a:ea typeface="+mn-ea"/>
+                <a:cs typeface="+mn-cs"/>
+              </a:defRPr>
+            </a:lvl8pPr>
+            <a:lvl9pPr marL="3886200" indent="-228600" algn="l" defTabSz="914400" rtl="0" eaLnBrk="1" latinLnBrk="0" hangingPunct="1">
+              <a:lnSpc>
+                <a:spcPct val="90000"/>
+              </a:lnSpc>
+              <a:spcBef>
+                <a:spcPts val="500"/>
+              </a:spcBef>
+              <a:buFont typeface="Arial" panose="020B0604020202020204" pitchFamily="34" charset="0"/>
+              <a:buChar char="•"/>
+              <a:defRPr sz="1600" kern="1200">
+                <a:solidFill>
+                  <a:schemeClr val="tx1"/>
+                </a:solidFill>
+                <a:latin typeface="+mn-lt"/>
+                <a:ea typeface="+mn-ea"/>
+                <a:cs typeface="+mn-cs"/>
+              </a:defRPr>
+            </a:lvl9pPr>
+          </a:lstStyle>
+          <a:p>
+            <a:r>
+              <a:rPr lang="hu-HU" sz="3600" dirty="0"/>
               <a:t>Kanta Áron: Frontend </a:t>
             </a:r>
             <a:r>
-              <a:rPr lang="hu-HU" dirty="0" err="1"/>
+              <a:rPr lang="hu-HU" sz="3600" dirty="0" err="1"/>
               <a:t>dizájnolása</a:t>
             </a:r>
-            <a:endParaRPr lang="hu-HU" dirty="0"/>
+            <a:r>
+              <a:rPr lang="hu-HU" sz="3600" dirty="0"/>
+              <a:t>, frontend dokumentáció írása (jelenleg még nincs prezentálható állapotban)</a:t>
+            </a:r>
           </a:p>
         </p:txBody>
       </p:sp>
@@ -8503,6 +8914,614 @@
   <p:clrMapOvr>
     <a:masterClrMapping/>
   </p:clrMapOvr>
+  <p:transition spd="slow">
+    <p:cover/>
+  </p:transition>
+  <p:timing>
+    <p:tnLst>
+      <p:par>
+        <p:cTn id="1" dur="indefinite" restart="never" nodeType="tmRoot">
+          <p:childTnLst>
+            <p:seq concurrent="1" nextAc="seek">
+              <p:cTn id="2" dur="indefinite" nodeType="mainSeq">
+                <p:childTnLst>
+                  <p:par>
+                    <p:cTn id="3" fill="hold">
+                      <p:stCondLst>
+                        <p:cond delay="indefinite"/>
+                      </p:stCondLst>
+                      <p:childTnLst>
+                        <p:par>
+                          <p:cTn id="4" fill="hold">
+                            <p:stCondLst>
+                              <p:cond delay="0"/>
+                            </p:stCondLst>
+                            <p:childTnLst>
+                              <p:par>
+                                <p:cTn id="5" presetID="26" presetClass="entr" presetSubtype="0" fill="hold" grpId="0" nodeType="clickEffect">
+                                  <p:stCondLst>
+                                    <p:cond delay="0"/>
+                                  </p:stCondLst>
+                                  <p:childTnLst>
+                                    <p:set>
+                                      <p:cBhvr>
+                                        <p:cTn id="6" dur="1" fill="hold">
+                                          <p:stCondLst>
+                                            <p:cond delay="0"/>
+                                          </p:stCondLst>
+                                        </p:cTn>
+                                        <p:tgtEl>
+                                          <p:spTgt spid="2"/>
+                                        </p:tgtEl>
+                                        <p:attrNameLst>
+                                          <p:attrName>style.visibility</p:attrName>
+                                        </p:attrNameLst>
+                                      </p:cBhvr>
+                                      <p:to>
+                                        <p:strVal val="visible"/>
+                                      </p:to>
+                                    </p:set>
+                                    <p:animEffect transition="in" filter="wipe(down)">
+                                      <p:cBhvr>
+                                        <p:cTn id="7" dur="580">
+                                          <p:stCondLst>
+                                            <p:cond delay="0"/>
+                                          </p:stCondLst>
+                                        </p:cTn>
+                                        <p:tgtEl>
+                                          <p:spTgt spid="2"/>
+                                        </p:tgtEl>
+                                      </p:cBhvr>
+                                    </p:animEffect>
+                                    <p:anim calcmode="lin" valueType="num">
+                                      <p:cBhvr>
+                                        <p:cTn id="8" dur="1822" tmFilter="0,0; 0.14,0.36; 0.43,0.73; 0.71,0.91; 1.0,1.0">
+                                          <p:stCondLst>
+                                            <p:cond delay="0"/>
+                                          </p:stCondLst>
+                                        </p:cTn>
+                                        <p:tgtEl>
+                                          <p:spTgt spid="2"/>
+                                        </p:tgtEl>
+                                        <p:attrNameLst>
+                                          <p:attrName>ppt_x</p:attrName>
+                                        </p:attrNameLst>
+                                      </p:cBhvr>
+                                      <p:tavLst>
+                                        <p:tav tm="0">
+                                          <p:val>
+                                            <p:strVal val="#ppt_x-0.25"/>
+                                          </p:val>
+                                        </p:tav>
+                                        <p:tav tm="100000">
+                                          <p:val>
+                                            <p:strVal val="#ppt_x"/>
+                                          </p:val>
+                                        </p:tav>
+                                      </p:tavLst>
+                                    </p:anim>
+                                    <p:anim calcmode="lin" valueType="num">
+                                      <p:cBhvr>
+                                        <p:cTn id="9" dur="664" tmFilter="0.0,0.0; 0.25,0.07; 0.50,0.2; 0.75,0.467; 1.0,1.0">
+                                          <p:stCondLst>
+                                            <p:cond delay="0"/>
+                                          </p:stCondLst>
+                                        </p:cTn>
+                                        <p:tgtEl>
+                                          <p:spTgt spid="2"/>
+                                        </p:tgtEl>
+                                        <p:attrNameLst>
+                                          <p:attrName>ppt_y</p:attrName>
+                                        </p:attrNameLst>
+                                      </p:cBhvr>
+                                      <p:tavLst>
+                                        <p:tav tm="0" fmla="#ppt_y-sin(pi*$)/3">
+                                          <p:val>
+                                            <p:fltVal val="0.5"/>
+                                          </p:val>
+                                        </p:tav>
+                                        <p:tav tm="100000">
+                                          <p:val>
+                                            <p:fltVal val="1"/>
+                                          </p:val>
+                                        </p:tav>
+                                      </p:tavLst>
+                                    </p:anim>
+                                    <p:anim calcmode="lin" valueType="num">
+                                      <p:cBhvr>
+                                        <p:cTn id="10" dur="664" tmFilter="0, 0; 0.125,0.2665; 0.25,0.4; 0.375,0.465; 0.5,0.5;  0.625,0.535; 0.75,0.6; 0.875,0.7335; 1,1">
+                                          <p:stCondLst>
+                                            <p:cond delay="664"/>
+                                          </p:stCondLst>
+                                        </p:cTn>
+                                        <p:tgtEl>
+                                          <p:spTgt spid="2"/>
+                                        </p:tgtEl>
+                                        <p:attrNameLst>
+                                          <p:attrName>ppt_y</p:attrName>
+                                        </p:attrNameLst>
+                                      </p:cBhvr>
+                                      <p:tavLst>
+                                        <p:tav tm="0" fmla="#ppt_y-sin(pi*$)/9">
+                                          <p:val>
+                                            <p:fltVal val="0"/>
+                                          </p:val>
+                                        </p:tav>
+                                        <p:tav tm="100000">
+                                          <p:val>
+                                            <p:fltVal val="1"/>
+                                          </p:val>
+                                        </p:tav>
+                                      </p:tavLst>
+                                    </p:anim>
+                                    <p:anim calcmode="lin" valueType="num">
+                                      <p:cBhvr>
+                                        <p:cTn id="11" dur="332" tmFilter="0, 0; 0.125,0.2665; 0.25,0.4; 0.375,0.465; 0.5,0.5;  0.625,0.535; 0.75,0.6; 0.875,0.7335; 1,1">
+                                          <p:stCondLst>
+                                            <p:cond delay="1324"/>
+                                          </p:stCondLst>
+                                        </p:cTn>
+                                        <p:tgtEl>
+                                          <p:spTgt spid="2"/>
+                                        </p:tgtEl>
+                                        <p:attrNameLst>
+                                          <p:attrName>ppt_y</p:attrName>
+                                        </p:attrNameLst>
+                                      </p:cBhvr>
+                                      <p:tavLst>
+                                        <p:tav tm="0" fmla="#ppt_y-sin(pi*$)/27">
+                                          <p:val>
+                                            <p:fltVal val="0"/>
+                                          </p:val>
+                                        </p:tav>
+                                        <p:tav tm="100000">
+                                          <p:val>
+                                            <p:fltVal val="1"/>
+                                          </p:val>
+                                        </p:tav>
+                                      </p:tavLst>
+                                    </p:anim>
+                                    <p:anim calcmode="lin" valueType="num">
+                                      <p:cBhvr>
+                                        <p:cTn id="12" dur="164" tmFilter="0, 0; 0.125,0.2665; 0.25,0.4; 0.375,0.465; 0.5,0.5;  0.625,0.535; 0.75,0.6; 0.875,0.7335; 1,1">
+                                          <p:stCondLst>
+                                            <p:cond delay="1656"/>
+                                          </p:stCondLst>
+                                        </p:cTn>
+                                        <p:tgtEl>
+                                          <p:spTgt spid="2"/>
+                                        </p:tgtEl>
+                                        <p:attrNameLst>
+                                          <p:attrName>ppt_y</p:attrName>
+                                        </p:attrNameLst>
+                                      </p:cBhvr>
+                                      <p:tavLst>
+                                        <p:tav tm="0" fmla="#ppt_y-sin(pi*$)/81">
+                                          <p:val>
+                                            <p:fltVal val="0"/>
+                                          </p:val>
+                                        </p:tav>
+                                        <p:tav tm="100000">
+                                          <p:val>
+                                            <p:fltVal val="1"/>
+                                          </p:val>
+                                        </p:tav>
+                                      </p:tavLst>
+                                    </p:anim>
+                                    <p:animScale>
+                                      <p:cBhvr>
+                                        <p:cTn id="13" dur="26">
+                                          <p:stCondLst>
+                                            <p:cond delay="650"/>
+                                          </p:stCondLst>
+                                        </p:cTn>
+                                        <p:tgtEl>
+                                          <p:spTgt spid="2"/>
+                                        </p:tgtEl>
+                                      </p:cBhvr>
+                                      <p:to x="100000" y="60000"/>
+                                    </p:animScale>
+                                    <p:animScale>
+                                      <p:cBhvr>
+                                        <p:cTn id="14" dur="166" decel="50000">
+                                          <p:stCondLst>
+                                            <p:cond delay="676"/>
+                                          </p:stCondLst>
+                                        </p:cTn>
+                                        <p:tgtEl>
+                                          <p:spTgt spid="2"/>
+                                        </p:tgtEl>
+                                      </p:cBhvr>
+                                      <p:to x="100000" y="100000"/>
+                                    </p:animScale>
+                                    <p:animScale>
+                                      <p:cBhvr>
+                                        <p:cTn id="15" dur="26">
+                                          <p:stCondLst>
+                                            <p:cond delay="1312"/>
+                                          </p:stCondLst>
+                                        </p:cTn>
+                                        <p:tgtEl>
+                                          <p:spTgt spid="2"/>
+                                        </p:tgtEl>
+                                      </p:cBhvr>
+                                      <p:to x="100000" y="80000"/>
+                                    </p:animScale>
+                                    <p:animScale>
+                                      <p:cBhvr>
+                                        <p:cTn id="16" dur="166" decel="50000">
+                                          <p:stCondLst>
+                                            <p:cond delay="1338"/>
+                                          </p:stCondLst>
+                                        </p:cTn>
+                                        <p:tgtEl>
+                                          <p:spTgt spid="2"/>
+                                        </p:tgtEl>
+                                      </p:cBhvr>
+                                      <p:to x="100000" y="100000"/>
+                                    </p:animScale>
+                                    <p:animScale>
+                                      <p:cBhvr>
+                                        <p:cTn id="17" dur="26">
+                                          <p:stCondLst>
+                                            <p:cond delay="1642"/>
+                                          </p:stCondLst>
+                                        </p:cTn>
+                                        <p:tgtEl>
+                                          <p:spTgt spid="2"/>
+                                        </p:tgtEl>
+                                      </p:cBhvr>
+                                      <p:to x="100000" y="90000"/>
+                                    </p:animScale>
+                                    <p:animScale>
+                                      <p:cBhvr>
+                                        <p:cTn id="18" dur="166" decel="50000">
+                                          <p:stCondLst>
+                                            <p:cond delay="1668"/>
+                                          </p:stCondLst>
+                                        </p:cTn>
+                                        <p:tgtEl>
+                                          <p:spTgt spid="2"/>
+                                        </p:tgtEl>
+                                      </p:cBhvr>
+                                      <p:to x="100000" y="100000"/>
+                                    </p:animScale>
+                                    <p:animScale>
+                                      <p:cBhvr>
+                                        <p:cTn id="19" dur="26">
+                                          <p:stCondLst>
+                                            <p:cond delay="1808"/>
+                                          </p:stCondLst>
+                                        </p:cTn>
+                                        <p:tgtEl>
+                                          <p:spTgt spid="2"/>
+                                        </p:tgtEl>
+                                      </p:cBhvr>
+                                      <p:to x="100000" y="95000"/>
+                                    </p:animScale>
+                                    <p:animScale>
+                                      <p:cBhvr>
+                                        <p:cTn id="20" dur="166" decel="50000">
+                                          <p:stCondLst>
+                                            <p:cond delay="1834"/>
+                                          </p:stCondLst>
+                                        </p:cTn>
+                                        <p:tgtEl>
+                                          <p:spTgt spid="2"/>
+                                        </p:tgtEl>
+                                      </p:cBhvr>
+                                      <p:to x="100000" y="100000"/>
+                                    </p:animScale>
+                                  </p:childTnLst>
+                                </p:cTn>
+                              </p:par>
+                            </p:childTnLst>
+                          </p:cTn>
+                        </p:par>
+                      </p:childTnLst>
+                    </p:cTn>
+                  </p:par>
+                  <p:par>
+                    <p:cTn id="21" fill="hold">
+                      <p:stCondLst>
+                        <p:cond delay="indefinite"/>
+                      </p:stCondLst>
+                      <p:childTnLst>
+                        <p:par>
+                          <p:cTn id="22" fill="hold">
+                            <p:stCondLst>
+                              <p:cond delay="0"/>
+                            </p:stCondLst>
+                            <p:childTnLst>
+                              <p:par>
+                                <p:cTn id="23" presetID="2" presetClass="entr" presetSubtype="4" fill="hold" grpId="0" nodeType="clickEffect">
+                                  <p:stCondLst>
+                                    <p:cond delay="0"/>
+                                  </p:stCondLst>
+                                  <p:childTnLst>
+                                    <p:set>
+                                      <p:cBhvr>
+                                        <p:cTn id="24" dur="1" fill="hold">
+                                          <p:stCondLst>
+                                            <p:cond delay="0"/>
+                                          </p:stCondLst>
+                                        </p:cTn>
+                                        <p:tgtEl>
+                                          <p:spTgt spid="7"/>
+                                        </p:tgtEl>
+                                        <p:attrNameLst>
+                                          <p:attrName>style.visibility</p:attrName>
+                                        </p:attrNameLst>
+                                      </p:cBhvr>
+                                      <p:to>
+                                        <p:strVal val="visible"/>
+                                      </p:to>
+                                    </p:set>
+                                    <p:anim calcmode="lin" valueType="num">
+                                      <p:cBhvr additive="base">
+                                        <p:cTn id="25" dur="500" fill="hold"/>
+                                        <p:tgtEl>
+                                          <p:spTgt spid="7"/>
+                                        </p:tgtEl>
+                                        <p:attrNameLst>
+                                          <p:attrName>ppt_x</p:attrName>
+                                        </p:attrNameLst>
+                                      </p:cBhvr>
+                                      <p:tavLst>
+                                        <p:tav tm="0">
+                                          <p:val>
+                                            <p:strVal val="#ppt_x"/>
+                                          </p:val>
+                                        </p:tav>
+                                        <p:tav tm="100000">
+                                          <p:val>
+                                            <p:strVal val="#ppt_x"/>
+                                          </p:val>
+                                        </p:tav>
+                                      </p:tavLst>
+                                    </p:anim>
+                                    <p:anim calcmode="lin" valueType="num">
+                                      <p:cBhvr additive="base">
+                                        <p:cTn id="26" dur="500" fill="hold"/>
+                                        <p:tgtEl>
+                                          <p:spTgt spid="7"/>
+                                        </p:tgtEl>
+                                        <p:attrNameLst>
+                                          <p:attrName>ppt_y</p:attrName>
+                                        </p:attrNameLst>
+                                      </p:cBhvr>
+                                      <p:tavLst>
+                                        <p:tav tm="0">
+                                          <p:val>
+                                            <p:strVal val="1+#ppt_h/2"/>
+                                          </p:val>
+                                        </p:tav>
+                                        <p:tav tm="100000">
+                                          <p:val>
+                                            <p:strVal val="#ppt_y"/>
+                                          </p:val>
+                                        </p:tav>
+                                      </p:tavLst>
+                                    </p:anim>
+                                  </p:childTnLst>
+                                </p:cTn>
+                              </p:par>
+                            </p:childTnLst>
+                          </p:cTn>
+                        </p:par>
+                      </p:childTnLst>
+                    </p:cTn>
+                  </p:par>
+                  <p:par>
+                    <p:cTn id="27" fill="hold">
+                      <p:stCondLst>
+                        <p:cond delay="indefinite"/>
+                      </p:stCondLst>
+                      <p:childTnLst>
+                        <p:par>
+                          <p:cTn id="28" fill="hold">
+                            <p:stCondLst>
+                              <p:cond delay="0"/>
+                            </p:stCondLst>
+                            <p:childTnLst>
+                              <p:par>
+                                <p:cTn id="29" presetID="2" presetClass="entr" presetSubtype="4" fill="hold" grpId="0" nodeType="clickEffect">
+                                  <p:stCondLst>
+                                    <p:cond delay="0"/>
+                                  </p:stCondLst>
+                                  <p:childTnLst>
+                                    <p:set>
+                                      <p:cBhvr>
+                                        <p:cTn id="30" dur="1" fill="hold">
+                                          <p:stCondLst>
+                                            <p:cond delay="0"/>
+                                          </p:stCondLst>
+                                        </p:cTn>
+                                        <p:tgtEl>
+                                          <p:spTgt spid="8"/>
+                                        </p:tgtEl>
+                                        <p:attrNameLst>
+                                          <p:attrName>style.visibility</p:attrName>
+                                        </p:attrNameLst>
+                                      </p:cBhvr>
+                                      <p:to>
+                                        <p:strVal val="visible"/>
+                                      </p:to>
+                                    </p:set>
+                                    <p:anim calcmode="lin" valueType="num">
+                                      <p:cBhvr additive="base">
+                                        <p:cTn id="31" dur="500" fill="hold"/>
+                                        <p:tgtEl>
+                                          <p:spTgt spid="8"/>
+                                        </p:tgtEl>
+                                        <p:attrNameLst>
+                                          <p:attrName>ppt_x</p:attrName>
+                                        </p:attrNameLst>
+                                      </p:cBhvr>
+                                      <p:tavLst>
+                                        <p:tav tm="0">
+                                          <p:val>
+                                            <p:strVal val="#ppt_x"/>
+                                          </p:val>
+                                        </p:tav>
+                                        <p:tav tm="100000">
+                                          <p:val>
+                                            <p:strVal val="#ppt_x"/>
+                                          </p:val>
+                                        </p:tav>
+                                      </p:tavLst>
+                                    </p:anim>
+                                    <p:anim calcmode="lin" valueType="num">
+                                      <p:cBhvr additive="base">
+                                        <p:cTn id="32" dur="500" fill="hold"/>
+                                        <p:tgtEl>
+                                          <p:spTgt spid="8"/>
+                                        </p:tgtEl>
+                                        <p:attrNameLst>
+                                          <p:attrName>ppt_y</p:attrName>
+                                        </p:attrNameLst>
+                                      </p:cBhvr>
+                                      <p:tavLst>
+                                        <p:tav tm="0">
+                                          <p:val>
+                                            <p:strVal val="1+#ppt_h/2"/>
+                                          </p:val>
+                                        </p:tav>
+                                        <p:tav tm="100000">
+                                          <p:val>
+                                            <p:strVal val="#ppt_y"/>
+                                          </p:val>
+                                        </p:tav>
+                                      </p:tavLst>
+                                    </p:anim>
+                                  </p:childTnLst>
+                                </p:cTn>
+                              </p:par>
+                            </p:childTnLst>
+                          </p:cTn>
+                        </p:par>
+                      </p:childTnLst>
+                    </p:cTn>
+                  </p:par>
+                  <p:par>
+                    <p:cTn id="33" fill="hold">
+                      <p:stCondLst>
+                        <p:cond delay="indefinite"/>
+                      </p:stCondLst>
+                      <p:childTnLst>
+                        <p:par>
+                          <p:cTn id="34" fill="hold">
+                            <p:stCondLst>
+                              <p:cond delay="0"/>
+                            </p:stCondLst>
+                            <p:childTnLst>
+                              <p:par>
+                                <p:cTn id="35" presetID="2" presetClass="entr" presetSubtype="4" fill="hold" grpId="0" nodeType="clickEffect">
+                                  <p:stCondLst>
+                                    <p:cond delay="0"/>
+                                  </p:stCondLst>
+                                  <p:childTnLst>
+                                    <p:set>
+                                      <p:cBhvr>
+                                        <p:cTn id="36" dur="1" fill="hold">
+                                          <p:stCondLst>
+                                            <p:cond delay="0"/>
+                                          </p:stCondLst>
+                                        </p:cTn>
+                                        <p:tgtEl>
+                                          <p:spTgt spid="9"/>
+                                        </p:tgtEl>
+                                        <p:attrNameLst>
+                                          <p:attrName>style.visibility</p:attrName>
+                                        </p:attrNameLst>
+                                      </p:cBhvr>
+                                      <p:to>
+                                        <p:strVal val="visible"/>
+                                      </p:to>
+                                    </p:set>
+                                    <p:anim calcmode="lin" valueType="num">
+                                      <p:cBhvr additive="base">
+                                        <p:cTn id="37" dur="500" fill="hold"/>
+                                        <p:tgtEl>
+                                          <p:spTgt spid="9"/>
+                                        </p:tgtEl>
+                                        <p:attrNameLst>
+                                          <p:attrName>ppt_x</p:attrName>
+                                        </p:attrNameLst>
+                                      </p:cBhvr>
+                                      <p:tavLst>
+                                        <p:tav tm="0">
+                                          <p:val>
+                                            <p:strVal val="#ppt_x"/>
+                                          </p:val>
+                                        </p:tav>
+                                        <p:tav tm="100000">
+                                          <p:val>
+                                            <p:strVal val="#ppt_x"/>
+                                          </p:val>
+                                        </p:tav>
+                                      </p:tavLst>
+                                    </p:anim>
+                                    <p:anim calcmode="lin" valueType="num">
+                                      <p:cBhvr additive="base">
+                                        <p:cTn id="38" dur="500" fill="hold"/>
+                                        <p:tgtEl>
+                                          <p:spTgt spid="9"/>
+                                        </p:tgtEl>
+                                        <p:attrNameLst>
+                                          <p:attrName>ppt_y</p:attrName>
+                                        </p:attrNameLst>
+                                      </p:cBhvr>
+                                      <p:tavLst>
+                                        <p:tav tm="0">
+                                          <p:val>
+                                            <p:strVal val="1+#ppt_h/2"/>
+                                          </p:val>
+                                        </p:tav>
+                                        <p:tav tm="100000">
+                                          <p:val>
+                                            <p:strVal val="#ppt_y"/>
+                                          </p:val>
+                                        </p:tav>
+                                      </p:tavLst>
+                                    </p:anim>
+                                  </p:childTnLst>
+                                </p:cTn>
+                              </p:par>
+                            </p:childTnLst>
+                          </p:cTn>
+                        </p:par>
+                      </p:childTnLst>
+                    </p:cTn>
+                  </p:par>
+                </p:childTnLst>
+              </p:cTn>
+              <p:prevCondLst>
+                <p:cond evt="onPrev" delay="0">
+                  <p:tgtEl>
+                    <p:sldTgt/>
+                  </p:tgtEl>
+                </p:cond>
+              </p:prevCondLst>
+              <p:nextCondLst>
+                <p:cond evt="onNext" delay="0">
+                  <p:tgtEl>
+                    <p:sldTgt/>
+                  </p:tgtEl>
+                </p:cond>
+              </p:nextCondLst>
+            </p:seq>
+          </p:childTnLst>
+        </p:cTn>
+      </p:par>
+    </p:tnLst>
+    <p:bldLst>
+      <p:bldP spid="2" grpId="0"/>
+      <p:bldP spid="7" grpId="0"/>
+      <p:bldP spid="8" grpId="0"/>
+      <p:bldP spid="9" grpId="0"/>
+    </p:bldLst>
+  </p:timing>
 </p:sld>
 </file>
 
@@ -8714,10 +9733,883 @@
   <p:clrMapOvr>
     <a:masterClrMapping/>
   </p:clrMapOvr>
+  <p:transition spd="slow">
+    <p:cover/>
+  </p:transition>
+  <p:timing>
+    <p:tnLst>
+      <p:par>
+        <p:cTn id="1" dur="indefinite" restart="never" nodeType="tmRoot">
+          <p:childTnLst>
+            <p:seq concurrent="1" nextAc="seek">
+              <p:cTn id="2" dur="indefinite" nodeType="mainSeq">
+                <p:childTnLst>
+                  <p:par>
+                    <p:cTn id="3" fill="hold">
+                      <p:stCondLst>
+                        <p:cond delay="indefinite"/>
+                      </p:stCondLst>
+                      <p:childTnLst>
+                        <p:par>
+                          <p:cTn id="4" fill="hold">
+                            <p:stCondLst>
+                              <p:cond delay="0"/>
+                            </p:stCondLst>
+                            <p:childTnLst>
+                              <p:par>
+                                <p:cTn id="5" presetID="42" presetClass="entr" presetSubtype="0" fill="hold" grpId="0" nodeType="clickEffect">
+                                  <p:stCondLst>
+                                    <p:cond delay="0"/>
+                                  </p:stCondLst>
+                                  <p:childTnLst>
+                                    <p:set>
+                                      <p:cBhvr>
+                                        <p:cTn id="6" dur="1" fill="hold">
+                                          <p:stCondLst>
+                                            <p:cond delay="0"/>
+                                          </p:stCondLst>
+                                        </p:cTn>
+                                        <p:tgtEl>
+                                          <p:spTgt spid="2"/>
+                                        </p:tgtEl>
+                                        <p:attrNameLst>
+                                          <p:attrName>style.visibility</p:attrName>
+                                        </p:attrNameLst>
+                                      </p:cBhvr>
+                                      <p:to>
+                                        <p:strVal val="visible"/>
+                                      </p:to>
+                                    </p:set>
+                                    <p:animEffect transition="in" filter="fade">
+                                      <p:cBhvr>
+                                        <p:cTn id="7" dur="500"/>
+                                        <p:tgtEl>
+                                          <p:spTgt spid="2"/>
+                                        </p:tgtEl>
+                                      </p:cBhvr>
+                                    </p:animEffect>
+                                    <p:anim calcmode="lin" valueType="num">
+                                      <p:cBhvr>
+                                        <p:cTn id="8" dur="500" fill="hold"/>
+                                        <p:tgtEl>
+                                          <p:spTgt spid="2"/>
+                                        </p:tgtEl>
+                                        <p:attrNameLst>
+                                          <p:attrName>ppt_x</p:attrName>
+                                        </p:attrNameLst>
+                                      </p:cBhvr>
+                                      <p:tavLst>
+                                        <p:tav tm="0">
+                                          <p:val>
+                                            <p:strVal val="#ppt_x"/>
+                                          </p:val>
+                                        </p:tav>
+                                        <p:tav tm="100000">
+                                          <p:val>
+                                            <p:strVal val="#ppt_x"/>
+                                          </p:val>
+                                        </p:tav>
+                                      </p:tavLst>
+                                    </p:anim>
+                                    <p:anim calcmode="lin" valueType="num">
+                                      <p:cBhvr>
+                                        <p:cTn id="9" dur="500" fill="hold"/>
+                                        <p:tgtEl>
+                                          <p:spTgt spid="2"/>
+                                        </p:tgtEl>
+                                        <p:attrNameLst>
+                                          <p:attrName>ppt_y</p:attrName>
+                                        </p:attrNameLst>
+                                      </p:cBhvr>
+                                      <p:tavLst>
+                                        <p:tav tm="0">
+                                          <p:val>
+                                            <p:strVal val="#ppt_y+.1"/>
+                                          </p:val>
+                                        </p:tav>
+                                        <p:tav tm="100000">
+                                          <p:val>
+                                            <p:strVal val="#ppt_y"/>
+                                          </p:val>
+                                        </p:tav>
+                                      </p:tavLst>
+                                    </p:anim>
+                                  </p:childTnLst>
+                                </p:cTn>
+                              </p:par>
+                            </p:childTnLst>
+                          </p:cTn>
+                        </p:par>
+                      </p:childTnLst>
+                    </p:cTn>
+                  </p:par>
+                  <p:par>
+                    <p:cTn id="10" fill="hold">
+                      <p:stCondLst>
+                        <p:cond delay="indefinite"/>
+                      </p:stCondLst>
+                      <p:childTnLst>
+                        <p:par>
+                          <p:cTn id="11" fill="hold">
+                            <p:stCondLst>
+                              <p:cond delay="0"/>
+                            </p:stCondLst>
+                            <p:childTnLst>
+                              <p:par>
+                                <p:cTn id="12" presetID="26" presetClass="entr" presetSubtype="0" fill="hold" nodeType="clickEffect">
+                                  <p:stCondLst>
+                                    <p:cond delay="0"/>
+                                  </p:stCondLst>
+                                  <p:childTnLst>
+                                    <p:set>
+                                      <p:cBhvr>
+                                        <p:cTn id="13" dur="1" fill="hold">
+                                          <p:stCondLst>
+                                            <p:cond delay="0"/>
+                                          </p:stCondLst>
+                                        </p:cTn>
+                                        <p:tgtEl>
+                                          <p:spTgt spid="6"/>
+                                        </p:tgtEl>
+                                        <p:attrNameLst>
+                                          <p:attrName>style.visibility</p:attrName>
+                                        </p:attrNameLst>
+                                      </p:cBhvr>
+                                      <p:to>
+                                        <p:strVal val="visible"/>
+                                      </p:to>
+                                    </p:set>
+                                    <p:animEffect transition="in" filter="wipe(down)">
+                                      <p:cBhvr>
+                                        <p:cTn id="14" dur="435">
+                                          <p:stCondLst>
+                                            <p:cond delay="0"/>
+                                          </p:stCondLst>
+                                        </p:cTn>
+                                        <p:tgtEl>
+                                          <p:spTgt spid="6"/>
+                                        </p:tgtEl>
+                                      </p:cBhvr>
+                                    </p:animEffect>
+                                    <p:anim calcmode="lin" valueType="num">
+                                      <p:cBhvr>
+                                        <p:cTn id="15" dur="1367" tmFilter="0,0; 0.14,0.36; 0.43,0.73; 0.71,0.91; 1.0,1.0">
+                                          <p:stCondLst>
+                                            <p:cond delay="0"/>
+                                          </p:stCondLst>
+                                        </p:cTn>
+                                        <p:tgtEl>
+                                          <p:spTgt spid="6"/>
+                                        </p:tgtEl>
+                                        <p:attrNameLst>
+                                          <p:attrName>ppt_x</p:attrName>
+                                        </p:attrNameLst>
+                                      </p:cBhvr>
+                                      <p:tavLst>
+                                        <p:tav tm="0">
+                                          <p:val>
+                                            <p:strVal val="#ppt_x-0.25"/>
+                                          </p:val>
+                                        </p:tav>
+                                        <p:tav tm="100000">
+                                          <p:val>
+                                            <p:strVal val="#ppt_x"/>
+                                          </p:val>
+                                        </p:tav>
+                                      </p:tavLst>
+                                    </p:anim>
+                                    <p:anim calcmode="lin" valueType="num">
+                                      <p:cBhvr>
+                                        <p:cTn id="16" dur="498" tmFilter="0.0,0.0; 0.25,0.07; 0.50,0.2; 0.75,0.467; 1.0,1.0">
+                                          <p:stCondLst>
+                                            <p:cond delay="0"/>
+                                          </p:stCondLst>
+                                        </p:cTn>
+                                        <p:tgtEl>
+                                          <p:spTgt spid="6"/>
+                                        </p:tgtEl>
+                                        <p:attrNameLst>
+                                          <p:attrName>ppt_y</p:attrName>
+                                        </p:attrNameLst>
+                                      </p:cBhvr>
+                                      <p:tavLst>
+                                        <p:tav tm="0" fmla="#ppt_y-sin(pi*$)/3">
+                                          <p:val>
+                                            <p:fltVal val="0.5"/>
+                                          </p:val>
+                                        </p:tav>
+                                        <p:tav tm="100000">
+                                          <p:val>
+                                            <p:fltVal val="1"/>
+                                          </p:val>
+                                        </p:tav>
+                                      </p:tavLst>
+                                    </p:anim>
+                                    <p:anim calcmode="lin" valueType="num">
+                                      <p:cBhvr>
+                                        <p:cTn id="17" dur="498" tmFilter="0, 0; 0.125,0.2665; 0.25,0.4; 0.375,0.465; 0.5,0.5;  0.625,0.535; 0.75,0.6; 0.875,0.7335; 1,1">
+                                          <p:stCondLst>
+                                            <p:cond delay="498"/>
+                                          </p:stCondLst>
+                                        </p:cTn>
+                                        <p:tgtEl>
+                                          <p:spTgt spid="6"/>
+                                        </p:tgtEl>
+                                        <p:attrNameLst>
+                                          <p:attrName>ppt_y</p:attrName>
+                                        </p:attrNameLst>
+                                      </p:cBhvr>
+                                      <p:tavLst>
+                                        <p:tav tm="0" fmla="#ppt_y-sin(pi*$)/9">
+                                          <p:val>
+                                            <p:fltVal val="0"/>
+                                          </p:val>
+                                        </p:tav>
+                                        <p:tav tm="100000">
+                                          <p:val>
+                                            <p:fltVal val="1"/>
+                                          </p:val>
+                                        </p:tav>
+                                      </p:tavLst>
+                                    </p:anim>
+                                    <p:anim calcmode="lin" valueType="num">
+                                      <p:cBhvr>
+                                        <p:cTn id="18" dur="249" tmFilter="0, 0; 0.125,0.2665; 0.25,0.4; 0.375,0.465; 0.5,0.5;  0.625,0.535; 0.75,0.6; 0.875,0.7335; 1,1">
+                                          <p:stCondLst>
+                                            <p:cond delay="993"/>
+                                          </p:stCondLst>
+                                        </p:cTn>
+                                        <p:tgtEl>
+                                          <p:spTgt spid="6"/>
+                                        </p:tgtEl>
+                                        <p:attrNameLst>
+                                          <p:attrName>ppt_y</p:attrName>
+                                        </p:attrNameLst>
+                                      </p:cBhvr>
+                                      <p:tavLst>
+                                        <p:tav tm="0" fmla="#ppt_y-sin(pi*$)/27">
+                                          <p:val>
+                                            <p:fltVal val="0"/>
+                                          </p:val>
+                                        </p:tav>
+                                        <p:tav tm="100000">
+                                          <p:val>
+                                            <p:fltVal val="1"/>
+                                          </p:val>
+                                        </p:tav>
+                                      </p:tavLst>
+                                    </p:anim>
+                                    <p:anim calcmode="lin" valueType="num">
+                                      <p:cBhvr>
+                                        <p:cTn id="19" dur="123" tmFilter="0, 0; 0.125,0.2665; 0.25,0.4; 0.375,0.465; 0.5,0.5;  0.625,0.535; 0.75,0.6; 0.875,0.7335; 1,1">
+                                          <p:stCondLst>
+                                            <p:cond delay="1242"/>
+                                          </p:stCondLst>
+                                        </p:cTn>
+                                        <p:tgtEl>
+                                          <p:spTgt spid="6"/>
+                                        </p:tgtEl>
+                                        <p:attrNameLst>
+                                          <p:attrName>ppt_y</p:attrName>
+                                        </p:attrNameLst>
+                                      </p:cBhvr>
+                                      <p:tavLst>
+                                        <p:tav tm="0" fmla="#ppt_y-sin(pi*$)/81">
+                                          <p:val>
+                                            <p:fltVal val="0"/>
+                                          </p:val>
+                                        </p:tav>
+                                        <p:tav tm="100000">
+                                          <p:val>
+                                            <p:fltVal val="1"/>
+                                          </p:val>
+                                        </p:tav>
+                                      </p:tavLst>
+                                    </p:anim>
+                                    <p:animScale>
+                                      <p:cBhvr>
+                                        <p:cTn id="20" dur="20">
+                                          <p:stCondLst>
+                                            <p:cond delay="487"/>
+                                          </p:stCondLst>
+                                        </p:cTn>
+                                        <p:tgtEl>
+                                          <p:spTgt spid="6"/>
+                                        </p:tgtEl>
+                                      </p:cBhvr>
+                                      <p:to x="100000" y="60000"/>
+                                    </p:animScale>
+                                    <p:animScale>
+                                      <p:cBhvr>
+                                        <p:cTn id="21" dur="124" decel="50000">
+                                          <p:stCondLst>
+                                            <p:cond delay="507"/>
+                                          </p:stCondLst>
+                                        </p:cTn>
+                                        <p:tgtEl>
+                                          <p:spTgt spid="6"/>
+                                        </p:tgtEl>
+                                      </p:cBhvr>
+                                      <p:to x="100000" y="100000"/>
+                                    </p:animScale>
+                                    <p:animScale>
+                                      <p:cBhvr>
+                                        <p:cTn id="22" dur="20">
+                                          <p:stCondLst>
+                                            <p:cond delay="984"/>
+                                          </p:stCondLst>
+                                        </p:cTn>
+                                        <p:tgtEl>
+                                          <p:spTgt spid="6"/>
+                                        </p:tgtEl>
+                                      </p:cBhvr>
+                                      <p:to x="100000" y="80000"/>
+                                    </p:animScale>
+                                    <p:animScale>
+                                      <p:cBhvr>
+                                        <p:cTn id="23" dur="124" decel="50000">
+                                          <p:stCondLst>
+                                            <p:cond delay="1004"/>
+                                          </p:stCondLst>
+                                        </p:cTn>
+                                        <p:tgtEl>
+                                          <p:spTgt spid="6"/>
+                                        </p:tgtEl>
+                                      </p:cBhvr>
+                                      <p:to x="100000" y="100000"/>
+                                    </p:animScale>
+                                    <p:animScale>
+                                      <p:cBhvr>
+                                        <p:cTn id="24" dur="20">
+                                          <p:stCondLst>
+                                            <p:cond delay="1231"/>
+                                          </p:stCondLst>
+                                        </p:cTn>
+                                        <p:tgtEl>
+                                          <p:spTgt spid="6"/>
+                                        </p:tgtEl>
+                                      </p:cBhvr>
+                                      <p:to x="100000" y="90000"/>
+                                    </p:animScale>
+                                    <p:animScale>
+                                      <p:cBhvr>
+                                        <p:cTn id="25" dur="124" decel="50000">
+                                          <p:stCondLst>
+                                            <p:cond delay="1251"/>
+                                          </p:stCondLst>
+                                        </p:cTn>
+                                        <p:tgtEl>
+                                          <p:spTgt spid="6"/>
+                                        </p:tgtEl>
+                                      </p:cBhvr>
+                                      <p:to x="100000" y="100000"/>
+                                    </p:animScale>
+                                    <p:animScale>
+                                      <p:cBhvr>
+                                        <p:cTn id="26" dur="20">
+                                          <p:stCondLst>
+                                            <p:cond delay="1356"/>
+                                          </p:stCondLst>
+                                        </p:cTn>
+                                        <p:tgtEl>
+                                          <p:spTgt spid="6"/>
+                                        </p:tgtEl>
+                                      </p:cBhvr>
+                                      <p:to x="100000" y="95000"/>
+                                    </p:animScale>
+                                    <p:animScale>
+                                      <p:cBhvr>
+                                        <p:cTn id="27" dur="124" decel="50000">
+                                          <p:stCondLst>
+                                            <p:cond delay="1376"/>
+                                          </p:stCondLst>
+                                        </p:cTn>
+                                        <p:tgtEl>
+                                          <p:spTgt spid="6"/>
+                                        </p:tgtEl>
+                                      </p:cBhvr>
+                                      <p:to x="100000" y="100000"/>
+                                    </p:animScale>
+                                  </p:childTnLst>
+                                </p:cTn>
+                              </p:par>
+                            </p:childTnLst>
+                          </p:cTn>
+                        </p:par>
+                      </p:childTnLst>
+                    </p:cTn>
+                  </p:par>
+                </p:childTnLst>
+              </p:cTn>
+              <p:prevCondLst>
+                <p:cond evt="onPrev" delay="0">
+                  <p:tgtEl>
+                    <p:sldTgt/>
+                  </p:tgtEl>
+                </p:cond>
+              </p:prevCondLst>
+              <p:nextCondLst>
+                <p:cond evt="onNext" delay="0">
+                  <p:tgtEl>
+                    <p:sldTgt/>
+                  </p:tgtEl>
+                </p:cond>
+              </p:nextCondLst>
+            </p:seq>
+          </p:childTnLst>
+        </p:cTn>
+      </p:par>
+    </p:tnLst>
+    <p:bldLst>
+      <p:bldP spid="2" grpId="0"/>
+    </p:bldLst>
+  </p:timing>
 </p:sld>
 </file>
 
 <file path=ppt/slides/slide5.xml><?xml version="1.0" encoding="utf-8"?>
+<p:sld xmlns:a="http://schemas.openxmlformats.org/drawingml/2006/main" xmlns:r="http://schemas.openxmlformats.org/officeDocument/2006/relationships" xmlns:p="http://schemas.openxmlformats.org/presentationml/2006/main">
+  <p:cSld>
+    <p:spTree>
+      <p:nvGrpSpPr>
+        <p:cNvPr id="1" name=""/>
+        <p:cNvGrpSpPr/>
+        <p:nvPr/>
+      </p:nvGrpSpPr>
+      <p:grpSpPr>
+        <a:xfrm>
+          <a:off x="0" y="0"/>
+          <a:ext cx="0" cy="0"/>
+          <a:chOff x="0" y="0"/>
+          <a:chExt cx="0" cy="0"/>
+        </a:xfrm>
+      </p:grpSpPr>
+      <p:sp>
+        <p:nvSpPr>
+          <p:cNvPr id="2" name="Cím 1">
+            <a:extLst>
+              <a:ext uri="{FF2B5EF4-FFF2-40B4-BE49-F238E27FC236}">
+                <a16:creationId xmlns:a16="http://schemas.microsoft.com/office/drawing/2014/main" id="{F18F72AB-4B86-4D8A-9893-BC4ADE9D0B37}"/>
+              </a:ext>
+            </a:extLst>
+          </p:cNvPr>
+          <p:cNvSpPr>
+            <a:spLocks noGrp="1"/>
+          </p:cNvSpPr>
+          <p:nvPr>
+            <p:ph type="title"/>
+          </p:nvPr>
+        </p:nvSpPr>
+        <p:spPr>
+          <a:xfrm>
+            <a:off x="-889000" y="1018373"/>
+            <a:ext cx="8610600" cy="1293028"/>
+          </a:xfrm>
+        </p:spPr>
+        <p:txBody>
+          <a:bodyPr/>
+          <a:lstStyle/>
+          <a:p>
+            <a:r>
+              <a:rPr lang="hu-HU" dirty="0"/>
+              <a:t>Backend</a:t>
+            </a:r>
+          </a:p>
+        </p:txBody>
+      </p:sp>
+    </p:spTree>
+    <p:extLst>
+      <p:ext uri="{BB962C8B-B14F-4D97-AF65-F5344CB8AC3E}">
+        <p14:creationId xmlns:p14="http://schemas.microsoft.com/office/powerpoint/2010/main" val="191161008"/>
+      </p:ext>
+    </p:extLst>
+  </p:cSld>
+  <p:clrMapOvr>
+    <a:masterClrMapping/>
+  </p:clrMapOvr>
+  <p:transition spd="slow">
+    <p:cover/>
+  </p:transition>
+  <p:timing>
+    <p:tnLst>
+      <p:par>
+        <p:cTn id="1" dur="indefinite" restart="never" nodeType="tmRoot">
+          <p:childTnLst>
+            <p:seq concurrent="1" nextAc="seek">
+              <p:cTn id="2" dur="indefinite" nodeType="mainSeq">
+                <p:childTnLst>
+                  <p:par>
+                    <p:cTn id="3" fill="hold">
+                      <p:stCondLst>
+                        <p:cond delay="indefinite"/>
+                      </p:stCondLst>
+                      <p:childTnLst>
+                        <p:par>
+                          <p:cTn id="4" fill="hold">
+                            <p:stCondLst>
+                              <p:cond delay="0"/>
+                            </p:stCondLst>
+                            <p:childTnLst>
+                              <p:par>
+                                <p:cTn id="5" presetID="31" presetClass="entr" presetSubtype="0" fill="hold" grpId="0" nodeType="clickEffect">
+                                  <p:stCondLst>
+                                    <p:cond delay="0"/>
+                                  </p:stCondLst>
+                                  <p:childTnLst>
+                                    <p:set>
+                                      <p:cBhvr>
+                                        <p:cTn id="6" dur="1" fill="hold">
+                                          <p:stCondLst>
+                                            <p:cond delay="0"/>
+                                          </p:stCondLst>
+                                        </p:cTn>
+                                        <p:tgtEl>
+                                          <p:spTgt spid="2"/>
+                                        </p:tgtEl>
+                                        <p:attrNameLst>
+                                          <p:attrName>style.visibility</p:attrName>
+                                        </p:attrNameLst>
+                                      </p:cBhvr>
+                                      <p:to>
+                                        <p:strVal val="visible"/>
+                                      </p:to>
+                                    </p:set>
+                                    <p:anim calcmode="lin" valueType="num">
+                                      <p:cBhvr>
+                                        <p:cTn id="7" dur="500" fill="hold"/>
+                                        <p:tgtEl>
+                                          <p:spTgt spid="2"/>
+                                        </p:tgtEl>
+                                        <p:attrNameLst>
+                                          <p:attrName>ppt_w</p:attrName>
+                                        </p:attrNameLst>
+                                      </p:cBhvr>
+                                      <p:tavLst>
+                                        <p:tav tm="0">
+                                          <p:val>
+                                            <p:fltVal val="0"/>
+                                          </p:val>
+                                        </p:tav>
+                                        <p:tav tm="100000">
+                                          <p:val>
+                                            <p:strVal val="#ppt_w"/>
+                                          </p:val>
+                                        </p:tav>
+                                      </p:tavLst>
+                                    </p:anim>
+                                    <p:anim calcmode="lin" valueType="num">
+                                      <p:cBhvr>
+                                        <p:cTn id="8" dur="500" fill="hold"/>
+                                        <p:tgtEl>
+                                          <p:spTgt spid="2"/>
+                                        </p:tgtEl>
+                                        <p:attrNameLst>
+                                          <p:attrName>ppt_h</p:attrName>
+                                        </p:attrNameLst>
+                                      </p:cBhvr>
+                                      <p:tavLst>
+                                        <p:tav tm="0">
+                                          <p:val>
+                                            <p:fltVal val="0"/>
+                                          </p:val>
+                                        </p:tav>
+                                        <p:tav tm="100000">
+                                          <p:val>
+                                            <p:strVal val="#ppt_h"/>
+                                          </p:val>
+                                        </p:tav>
+                                      </p:tavLst>
+                                    </p:anim>
+                                    <p:anim calcmode="lin" valueType="num">
+                                      <p:cBhvr>
+                                        <p:cTn id="9" dur="500" fill="hold"/>
+                                        <p:tgtEl>
+                                          <p:spTgt spid="2"/>
+                                        </p:tgtEl>
+                                        <p:attrNameLst>
+                                          <p:attrName>style.rotation</p:attrName>
+                                        </p:attrNameLst>
+                                      </p:cBhvr>
+                                      <p:tavLst>
+                                        <p:tav tm="0">
+                                          <p:val>
+                                            <p:fltVal val="90"/>
+                                          </p:val>
+                                        </p:tav>
+                                        <p:tav tm="100000">
+                                          <p:val>
+                                            <p:fltVal val="0"/>
+                                          </p:val>
+                                        </p:tav>
+                                      </p:tavLst>
+                                    </p:anim>
+                                    <p:animEffect transition="in" filter="fade">
+                                      <p:cBhvr>
+                                        <p:cTn id="10" dur="500"/>
+                                        <p:tgtEl>
+                                          <p:spTgt spid="2"/>
+                                        </p:tgtEl>
+                                      </p:cBhvr>
+                                    </p:animEffect>
+                                  </p:childTnLst>
+                                </p:cTn>
+                              </p:par>
+                            </p:childTnLst>
+                          </p:cTn>
+                        </p:par>
+                      </p:childTnLst>
+                    </p:cTn>
+                  </p:par>
+                </p:childTnLst>
+              </p:cTn>
+              <p:prevCondLst>
+                <p:cond evt="onPrev" delay="0">
+                  <p:tgtEl>
+                    <p:sldTgt/>
+                  </p:tgtEl>
+                </p:cond>
+              </p:prevCondLst>
+              <p:nextCondLst>
+                <p:cond evt="onNext" delay="0">
+                  <p:tgtEl>
+                    <p:sldTgt/>
+                  </p:tgtEl>
+                </p:cond>
+              </p:nextCondLst>
+            </p:seq>
+          </p:childTnLst>
+        </p:cTn>
+      </p:par>
+    </p:tnLst>
+    <p:bldLst>
+      <p:bldP spid="2" grpId="0"/>
+    </p:bldLst>
+  </p:timing>
+</p:sld>
+</file>
+
+<file path=ppt/slides/slide6.xml><?xml version="1.0" encoding="utf-8"?>
+<p:sld xmlns:a="http://schemas.openxmlformats.org/drawingml/2006/main" xmlns:r="http://schemas.openxmlformats.org/officeDocument/2006/relationships" xmlns:p="http://schemas.openxmlformats.org/presentationml/2006/main">
+  <p:cSld>
+    <p:spTree>
+      <p:nvGrpSpPr>
+        <p:cNvPr id="1" name=""/>
+        <p:cNvGrpSpPr/>
+        <p:nvPr/>
+      </p:nvGrpSpPr>
+      <p:grpSpPr>
+        <a:xfrm>
+          <a:off x="0" y="0"/>
+          <a:ext cx="0" cy="0"/>
+          <a:chOff x="0" y="0"/>
+          <a:chExt cx="0" cy="0"/>
+        </a:xfrm>
+      </p:grpSpPr>
+      <p:sp>
+        <p:nvSpPr>
+          <p:cNvPr id="2" name="Cím 1">
+            <a:extLst>
+              <a:ext uri="{FF2B5EF4-FFF2-40B4-BE49-F238E27FC236}">
+                <a16:creationId xmlns:a16="http://schemas.microsoft.com/office/drawing/2014/main" id="{F18F72AB-4B86-4D8A-9893-BC4ADE9D0B37}"/>
+              </a:ext>
+            </a:extLst>
+          </p:cNvPr>
+          <p:cNvSpPr>
+            <a:spLocks noGrp="1"/>
+          </p:cNvSpPr>
+          <p:nvPr>
+            <p:ph type="title"/>
+          </p:nvPr>
+        </p:nvSpPr>
+        <p:spPr>
+          <a:xfrm>
+            <a:off x="-889000" y="1018373"/>
+            <a:ext cx="8610600" cy="1293028"/>
+          </a:xfrm>
+        </p:spPr>
+        <p:txBody>
+          <a:bodyPr/>
+          <a:lstStyle/>
+          <a:p>
+            <a:r>
+              <a:rPr lang="hu-HU" dirty="0"/>
+              <a:t>Frontend</a:t>
+            </a:r>
+          </a:p>
+        </p:txBody>
+      </p:sp>
+    </p:spTree>
+    <p:extLst>
+      <p:ext uri="{BB962C8B-B14F-4D97-AF65-F5344CB8AC3E}">
+        <p14:creationId xmlns:p14="http://schemas.microsoft.com/office/powerpoint/2010/main" val="2779646751"/>
+      </p:ext>
+    </p:extLst>
+  </p:cSld>
+  <p:clrMapOvr>
+    <a:masterClrMapping/>
+  </p:clrMapOvr>
+  <p:transition spd="slow">
+    <p:cover/>
+  </p:transition>
+  <p:timing>
+    <p:tnLst>
+      <p:par>
+        <p:cTn id="1" dur="indefinite" restart="never" nodeType="tmRoot">
+          <p:childTnLst>
+            <p:seq concurrent="1" nextAc="seek">
+              <p:cTn id="2" dur="indefinite" nodeType="mainSeq">
+                <p:childTnLst>
+                  <p:par>
+                    <p:cTn id="3" fill="hold">
+                      <p:stCondLst>
+                        <p:cond delay="indefinite"/>
+                      </p:stCondLst>
+                      <p:childTnLst>
+                        <p:par>
+                          <p:cTn id="4" fill="hold">
+                            <p:stCondLst>
+                              <p:cond delay="0"/>
+                            </p:stCondLst>
+                            <p:childTnLst>
+                              <p:par>
+                                <p:cTn id="5" presetID="31" presetClass="entr" presetSubtype="0" fill="hold" grpId="0" nodeType="clickEffect">
+                                  <p:stCondLst>
+                                    <p:cond delay="0"/>
+                                  </p:stCondLst>
+                                  <p:childTnLst>
+                                    <p:set>
+                                      <p:cBhvr>
+                                        <p:cTn id="6" dur="1" fill="hold">
+                                          <p:stCondLst>
+                                            <p:cond delay="0"/>
+                                          </p:stCondLst>
+                                        </p:cTn>
+                                        <p:tgtEl>
+                                          <p:spTgt spid="2"/>
+                                        </p:tgtEl>
+                                        <p:attrNameLst>
+                                          <p:attrName>style.visibility</p:attrName>
+                                        </p:attrNameLst>
+                                      </p:cBhvr>
+                                      <p:to>
+                                        <p:strVal val="visible"/>
+                                      </p:to>
+                                    </p:set>
+                                    <p:anim calcmode="lin" valueType="num">
+                                      <p:cBhvr>
+                                        <p:cTn id="7" dur="500" fill="hold"/>
+                                        <p:tgtEl>
+                                          <p:spTgt spid="2"/>
+                                        </p:tgtEl>
+                                        <p:attrNameLst>
+                                          <p:attrName>ppt_w</p:attrName>
+                                        </p:attrNameLst>
+                                      </p:cBhvr>
+                                      <p:tavLst>
+                                        <p:tav tm="0">
+                                          <p:val>
+                                            <p:fltVal val="0"/>
+                                          </p:val>
+                                        </p:tav>
+                                        <p:tav tm="100000">
+                                          <p:val>
+                                            <p:strVal val="#ppt_w"/>
+                                          </p:val>
+                                        </p:tav>
+                                      </p:tavLst>
+                                    </p:anim>
+                                    <p:anim calcmode="lin" valueType="num">
+                                      <p:cBhvr>
+                                        <p:cTn id="8" dur="500" fill="hold"/>
+                                        <p:tgtEl>
+                                          <p:spTgt spid="2"/>
+                                        </p:tgtEl>
+                                        <p:attrNameLst>
+                                          <p:attrName>ppt_h</p:attrName>
+                                        </p:attrNameLst>
+                                      </p:cBhvr>
+                                      <p:tavLst>
+                                        <p:tav tm="0">
+                                          <p:val>
+                                            <p:fltVal val="0"/>
+                                          </p:val>
+                                        </p:tav>
+                                        <p:tav tm="100000">
+                                          <p:val>
+                                            <p:strVal val="#ppt_h"/>
+                                          </p:val>
+                                        </p:tav>
+                                      </p:tavLst>
+                                    </p:anim>
+                                    <p:anim calcmode="lin" valueType="num">
+                                      <p:cBhvr>
+                                        <p:cTn id="9" dur="500" fill="hold"/>
+                                        <p:tgtEl>
+                                          <p:spTgt spid="2"/>
+                                        </p:tgtEl>
+                                        <p:attrNameLst>
+                                          <p:attrName>style.rotation</p:attrName>
+                                        </p:attrNameLst>
+                                      </p:cBhvr>
+                                      <p:tavLst>
+                                        <p:tav tm="0">
+                                          <p:val>
+                                            <p:fltVal val="90"/>
+                                          </p:val>
+                                        </p:tav>
+                                        <p:tav tm="100000">
+                                          <p:val>
+                                            <p:fltVal val="0"/>
+                                          </p:val>
+                                        </p:tav>
+                                      </p:tavLst>
+                                    </p:anim>
+                                    <p:animEffect transition="in" filter="fade">
+                                      <p:cBhvr>
+                                        <p:cTn id="10" dur="500"/>
+                                        <p:tgtEl>
+                                          <p:spTgt spid="2"/>
+                                        </p:tgtEl>
+                                      </p:cBhvr>
+                                    </p:animEffect>
+                                  </p:childTnLst>
+                                </p:cTn>
+                              </p:par>
+                            </p:childTnLst>
+                          </p:cTn>
+                        </p:par>
+                      </p:childTnLst>
+                    </p:cTn>
+                  </p:par>
+                </p:childTnLst>
+              </p:cTn>
+              <p:prevCondLst>
+                <p:cond evt="onPrev" delay="0">
+                  <p:tgtEl>
+                    <p:sldTgt/>
+                  </p:tgtEl>
+                </p:cond>
+              </p:prevCondLst>
+              <p:nextCondLst>
+                <p:cond evt="onNext" delay="0">
+                  <p:tgtEl>
+                    <p:sldTgt/>
+                  </p:tgtEl>
+                </p:cond>
+              </p:nextCondLst>
+            </p:seq>
+          </p:childTnLst>
+        </p:cTn>
+      </p:par>
+    </p:tnLst>
+    <p:bldLst>
+      <p:bldP spid="2" grpId="0"/>
+    </p:bldLst>
+  </p:timing>
+</p:sld>
+</file>
+
+<file path=ppt/slides/slide7.xml><?xml version="1.0" encoding="utf-8"?>
 <p:sld xmlns:a="http://schemas.openxmlformats.org/drawingml/2006/main" xmlns:r="http://schemas.openxmlformats.org/officeDocument/2006/relationships" xmlns:p="http://schemas.openxmlformats.org/presentationml/2006/main">
   <p:cSld>
     <p:bg>
@@ -8929,10 +10821,261 @@
   <p:clrMapOvr>
     <a:masterClrMapping/>
   </p:clrMapOvr>
+  <p:transition spd="slow">
+    <p:cover/>
+  </p:transition>
+  <p:timing>
+    <p:tnLst>
+      <p:par>
+        <p:cTn id="1" dur="indefinite" restart="never" nodeType="tmRoot">
+          <p:childTnLst>
+            <p:seq concurrent="1" nextAc="seek">
+              <p:cTn id="2" dur="indefinite" nodeType="mainSeq">
+                <p:childTnLst>
+                  <p:par>
+                    <p:cTn id="3" fill="hold">
+                      <p:stCondLst>
+                        <p:cond delay="indefinite"/>
+                      </p:stCondLst>
+                      <p:childTnLst>
+                        <p:par>
+                          <p:cTn id="4" fill="hold">
+                            <p:stCondLst>
+                              <p:cond delay="0"/>
+                            </p:stCondLst>
+                            <p:childTnLst>
+                              <p:par>
+                                <p:cTn id="5" presetID="42" presetClass="entr" presetSubtype="0" fill="hold" grpId="0" nodeType="clickEffect">
+                                  <p:stCondLst>
+                                    <p:cond delay="0"/>
+                                  </p:stCondLst>
+                                  <p:childTnLst>
+                                    <p:set>
+                                      <p:cBhvr>
+                                        <p:cTn id="6" dur="1" fill="hold">
+                                          <p:stCondLst>
+                                            <p:cond delay="0"/>
+                                          </p:stCondLst>
+                                        </p:cTn>
+                                        <p:tgtEl>
+                                          <p:spTgt spid="2"/>
+                                        </p:tgtEl>
+                                        <p:attrNameLst>
+                                          <p:attrName>style.visibility</p:attrName>
+                                        </p:attrNameLst>
+                                      </p:cBhvr>
+                                      <p:to>
+                                        <p:strVal val="visible"/>
+                                      </p:to>
+                                    </p:set>
+                                    <p:animEffect transition="in" filter="fade">
+                                      <p:cBhvr>
+                                        <p:cTn id="7" dur="500"/>
+                                        <p:tgtEl>
+                                          <p:spTgt spid="2"/>
+                                        </p:tgtEl>
+                                      </p:cBhvr>
+                                    </p:animEffect>
+                                    <p:anim calcmode="lin" valueType="num">
+                                      <p:cBhvr>
+                                        <p:cTn id="8" dur="500" fill="hold"/>
+                                        <p:tgtEl>
+                                          <p:spTgt spid="2"/>
+                                        </p:tgtEl>
+                                        <p:attrNameLst>
+                                          <p:attrName>ppt_x</p:attrName>
+                                        </p:attrNameLst>
+                                      </p:cBhvr>
+                                      <p:tavLst>
+                                        <p:tav tm="0">
+                                          <p:val>
+                                            <p:strVal val="#ppt_x"/>
+                                          </p:val>
+                                        </p:tav>
+                                        <p:tav tm="100000">
+                                          <p:val>
+                                            <p:strVal val="#ppt_x"/>
+                                          </p:val>
+                                        </p:tav>
+                                      </p:tavLst>
+                                    </p:anim>
+                                    <p:anim calcmode="lin" valueType="num">
+                                      <p:cBhvr>
+                                        <p:cTn id="9" dur="500" fill="hold"/>
+                                        <p:tgtEl>
+                                          <p:spTgt spid="2"/>
+                                        </p:tgtEl>
+                                        <p:attrNameLst>
+                                          <p:attrName>ppt_y</p:attrName>
+                                        </p:attrNameLst>
+                                      </p:cBhvr>
+                                      <p:tavLst>
+                                        <p:tav tm="0">
+                                          <p:val>
+                                            <p:strVal val="#ppt_y+.1"/>
+                                          </p:val>
+                                        </p:tav>
+                                        <p:tav tm="100000">
+                                          <p:val>
+                                            <p:strVal val="#ppt_y"/>
+                                          </p:val>
+                                        </p:tav>
+                                      </p:tavLst>
+                                    </p:anim>
+                                  </p:childTnLst>
+                                </p:cTn>
+                              </p:par>
+                            </p:childTnLst>
+                          </p:cTn>
+                        </p:par>
+                      </p:childTnLst>
+                    </p:cTn>
+                  </p:par>
+                  <p:par>
+                    <p:cTn id="10" fill="hold">
+                      <p:stCondLst>
+                        <p:cond delay="indefinite"/>
+                      </p:stCondLst>
+                      <p:childTnLst>
+                        <p:par>
+                          <p:cTn id="11" fill="hold">
+                            <p:stCondLst>
+                              <p:cond delay="0"/>
+                            </p:stCondLst>
+                            <p:childTnLst>
+                              <p:par>
+                                <p:cTn id="12" presetID="42" presetClass="entr" presetSubtype="0" fill="hold" grpId="0" nodeType="clickEffect">
+                                  <p:stCondLst>
+                                    <p:cond delay="0"/>
+                                  </p:stCondLst>
+                                  <p:childTnLst>
+                                    <p:set>
+                                      <p:cBhvr>
+                                        <p:cTn id="13" dur="1" fill="hold">
+                                          <p:stCondLst>
+                                            <p:cond delay="0"/>
+                                          </p:stCondLst>
+                                        </p:cTn>
+                                        <p:tgtEl>
+                                          <p:spTgt spid="4">
+                                            <p:txEl>
+                                              <p:pRg st="0" end="0"/>
+                                            </p:txEl>
+                                          </p:spTgt>
+                                        </p:tgtEl>
+                                        <p:attrNameLst>
+                                          <p:attrName>style.visibility</p:attrName>
+                                        </p:attrNameLst>
+                                      </p:cBhvr>
+                                      <p:to>
+                                        <p:strVal val="visible"/>
+                                      </p:to>
+                                    </p:set>
+                                    <p:animEffect transition="in" filter="fade">
+                                      <p:cBhvr>
+                                        <p:cTn id="14" dur="500"/>
+                                        <p:tgtEl>
+                                          <p:spTgt spid="4">
+                                            <p:txEl>
+                                              <p:pRg st="0" end="0"/>
+                                            </p:txEl>
+                                          </p:spTgt>
+                                        </p:tgtEl>
+                                      </p:cBhvr>
+                                    </p:animEffect>
+                                    <p:anim calcmode="lin" valueType="num">
+                                      <p:cBhvr>
+                                        <p:cTn id="15" dur="500" fill="hold"/>
+                                        <p:tgtEl>
+                                          <p:spTgt spid="4">
+                                            <p:txEl>
+                                              <p:pRg st="0" end="0"/>
+                                            </p:txEl>
+                                          </p:spTgt>
+                                        </p:tgtEl>
+                                        <p:attrNameLst>
+                                          <p:attrName>ppt_x</p:attrName>
+                                        </p:attrNameLst>
+                                      </p:cBhvr>
+                                      <p:tavLst>
+                                        <p:tav tm="0">
+                                          <p:val>
+                                            <p:strVal val="#ppt_x"/>
+                                          </p:val>
+                                        </p:tav>
+                                        <p:tav tm="100000">
+                                          <p:val>
+                                            <p:strVal val="#ppt_x"/>
+                                          </p:val>
+                                        </p:tav>
+                                      </p:tavLst>
+                                    </p:anim>
+                                    <p:anim calcmode="lin" valueType="num">
+                                      <p:cBhvr>
+                                        <p:cTn id="16" dur="500" fill="hold"/>
+                                        <p:tgtEl>
+                                          <p:spTgt spid="4">
+                                            <p:txEl>
+                                              <p:pRg st="0" end="0"/>
+                                            </p:txEl>
+                                          </p:spTgt>
+                                        </p:tgtEl>
+                                        <p:attrNameLst>
+                                          <p:attrName>ppt_y</p:attrName>
+                                        </p:attrNameLst>
+                                      </p:cBhvr>
+                                      <p:tavLst>
+                                        <p:tav tm="0">
+                                          <p:val>
+                                            <p:strVal val="#ppt_y+.1"/>
+                                          </p:val>
+                                        </p:tav>
+                                        <p:tav tm="100000">
+                                          <p:val>
+                                            <p:strVal val="#ppt_y"/>
+                                          </p:val>
+                                        </p:tav>
+                                      </p:tavLst>
+                                    </p:anim>
+                                  </p:childTnLst>
+                                </p:cTn>
+                              </p:par>
+                            </p:childTnLst>
+                          </p:cTn>
+                        </p:par>
+                      </p:childTnLst>
+                    </p:cTn>
+                  </p:par>
+                </p:childTnLst>
+              </p:cTn>
+              <p:prevCondLst>
+                <p:cond evt="onPrev" delay="0">
+                  <p:tgtEl>
+                    <p:sldTgt/>
+                  </p:tgtEl>
+                </p:cond>
+              </p:prevCondLst>
+              <p:nextCondLst>
+                <p:cond evt="onNext" delay="0">
+                  <p:tgtEl>
+                    <p:sldTgt/>
+                  </p:tgtEl>
+                </p:cond>
+              </p:nextCondLst>
+            </p:seq>
+          </p:childTnLst>
+        </p:cTn>
+      </p:par>
+    </p:tnLst>
+    <p:bldLst>
+      <p:bldP spid="2" grpId="0"/>
+      <p:bldP spid="4" grpId="0" build="p"/>
+    </p:bldLst>
+  </p:timing>
 </p:sld>
 </file>
 
-<file path=ppt/slides/slide6.xml><?xml version="1.0" encoding="utf-8"?>
+<file path=ppt/slides/slide8.xml><?xml version="1.0" encoding="utf-8"?>
 <p:sld xmlns:a="http://schemas.openxmlformats.org/drawingml/2006/main" xmlns:r="http://schemas.openxmlformats.org/officeDocument/2006/relationships" xmlns:p="http://schemas.openxmlformats.org/presentationml/2006/main">
   <p:cSld>
     <p:bg>
@@ -9047,51 +11190,6 @@
           </a:prstGeom>
         </p:spPr>
       </p:pic>
-      <p:pic>
-        <p:nvPicPr>
-          <p:cNvPr id="7" name="Kép 6" descr="Leveleket ábrázoló ceruzarajz">
-            <a:extLst>
-              <a:ext uri="{FF2B5EF4-FFF2-40B4-BE49-F238E27FC236}">
-                <a16:creationId xmlns:a16="http://schemas.microsoft.com/office/drawing/2014/main" id="{57D7C723-A9F3-4A7E-B1AE-E6A0CCF40F7E}"/>
-              </a:ext>
-            </a:extLst>
-          </p:cNvPr>
-          <p:cNvPicPr>
-            <a:picLocks noChangeAspect="1"/>
-          </p:cNvPicPr>
-          <p:nvPr/>
-        </p:nvPicPr>
-        <p:blipFill rotWithShape="1">
-          <a:blip r:embed="rId5" cstate="print">
-            <a:alphaModFix amt="40000"/>
-            <a:extLst>
-              <a:ext uri="{BEBA8EAE-BF5A-486C-A8C5-ECC9F3942E4B}">
-                <a14:imgProps xmlns:a14="http://schemas.microsoft.com/office/drawing/2010/main">
-                  <a14:imgLayer r:embed="rId6">
-                    <a14:imgEffect>
-                      <a14:artisticPencilSketch/>
-                    </a14:imgEffect>
-                  </a14:imgLayer>
-                </a14:imgProps>
-              </a:ext>
-              <a:ext uri="{28A0092B-C50C-407E-A947-70E740481C1C}">
-                <a14:useLocalDpi xmlns:a14="http://schemas.microsoft.com/office/drawing/2010/main"/>
-              </a:ext>
-            </a:extLst>
-          </a:blip>
-          <a:srcRect t="23881" r="3" b="4261"/>
-          <a:stretch/>
-        </p:blipFill>
-        <p:spPr>
-          <a:xfrm>
-            <a:off x="0" y="-24828"/>
-            <a:ext cx="12191980" cy="6857990"/>
-          </a:xfrm>
-          <a:prstGeom prst="rect">
-            <a:avLst/>
-          </a:prstGeom>
-        </p:spPr>
-      </p:pic>
       <p:sp>
         <p:nvSpPr>
           <p:cNvPr id="2" name="Cím 1">
@@ -9146,7 +11244,7 @@
         </p:nvSpPr>
         <p:spPr>
           <a:xfrm>
-            <a:off x="0" y="6490262"/>
+            <a:off x="-20" y="6686551"/>
             <a:ext cx="9448800" cy="685800"/>
           </a:xfrm>
         </p:spPr>
@@ -9160,7 +11258,7 @@
               <a:buNone/>
             </a:pPr>
             <a:r>
-              <a:rPr lang="hu-HU" sz="1400" b="1" dirty="0"/>
+              <a:rPr lang="hu-HU" sz="100" b="1" dirty="0"/>
               <a:t>valaki@example.com</a:t>
             </a:r>
           </a:p>
@@ -9176,6 +11274,18 @@
   <p:clrMapOvr>
     <a:masterClrMapping/>
   </p:clrMapOvr>
+  <mc:AlternateContent xmlns:mc="http://schemas.openxmlformats.org/markup-compatibility/2006" xmlns:p15="http://schemas.microsoft.com/office/powerpoint/2012/main">
+    <mc:Choice Requires="p15">
+      <p:transition xmlns:p14="http://schemas.microsoft.com/office/powerpoint/2010/main" spd="slow" p14:dur="2000">
+        <p15:prstTrans prst="prestige"/>
+      </p:transition>
+    </mc:Choice>
+    <mc:Fallback xmlns="">
+      <p:transition spd="slow">
+        <p:fade/>
+      </p:transition>
+    </mc:Fallback>
+  </mc:AlternateContent>
 </p:sld>
 </file>
 
@@ -10270,9 +12380,16 @@
 <file path=customXml/itemProps1.xml><?xml version="1.0" encoding="utf-8"?>
 <ds:datastoreItem xmlns:ds="http://schemas.openxmlformats.org/officeDocument/2006/customXml" ds:itemID="{17411068-54FB-4183-BE8D-9A5F0DE062BA}">
   <ds:schemaRefs>
+    <ds:schemaRef ds:uri="http://schemas.microsoft.com/office/2006/documentManagement/types"/>
+    <ds:schemaRef ds:uri="16c05727-aa75-4e4a-9b5f-8a80a1165891"/>
+    <ds:schemaRef ds:uri="http://purl.org/dc/terms/"/>
+    <ds:schemaRef ds:uri="http://purl.org/dc/dcmitype/"/>
+    <ds:schemaRef ds:uri="http://www.w3.org/XML/1998/namespace"/>
+    <ds:schemaRef ds:uri="71af3243-3dd4-4a8d-8c0d-dd76da1f02a5"/>
+    <ds:schemaRef ds:uri="http://purl.org/dc/elements/1.1/"/>
+    <ds:schemaRef ds:uri="http://schemas.microsoft.com/office/infopath/2007/PartnerControls"/>
+    <ds:schemaRef ds:uri="http://schemas.openxmlformats.org/package/2006/metadata/core-properties"/>
     <ds:schemaRef ds:uri="http://schemas.microsoft.com/office/2006/metadata/properties"/>
-    <ds:schemaRef ds:uri="http://schemas.microsoft.com/office/infopath/2007/PartnerControls"/>
-    <ds:schemaRef ds:uri="71af3243-3dd4-4a8d-8c0d-dd76da1f02a5"/>
   </ds:schemaRefs>
 </ds:datastoreItem>
 </file>

</xml_diff>